<commit_message>
Added Azure usage, key metrics and zt definition slides
</commit_message>
<xml_diff>
--- a/idea/Zero-Trust-Security-Using-ASPSecurityKit.pptx
+++ b/idea/Zero-Trust-Security-Using-ASPSecurityKit.pptx
@@ -5,39 +5,42 @@
     <p:sldMasterId id="2147483686" r:id="rId1"/>
   </p:sldMasterIdLst>
   <p:notesMasterIdLst>
-    <p:notesMasterId r:id="rId14"/>
+    <p:notesMasterId r:id="rId17"/>
   </p:notesMasterIdLst>
   <p:handoutMasterIdLst>
-    <p:handoutMasterId r:id="rId15"/>
+    <p:handoutMasterId r:id="rId18"/>
   </p:handoutMasterIdLst>
   <p:sldIdLst>
     <p:sldId id="256" r:id="rId2"/>
     <p:sldId id="257" r:id="rId3"/>
-    <p:sldId id="265" r:id="rId4"/>
-    <p:sldId id="266" r:id="rId5"/>
-    <p:sldId id="267" r:id="rId6"/>
-    <p:sldId id="258" r:id="rId7"/>
-    <p:sldId id="259" r:id="rId8"/>
-    <p:sldId id="260" r:id="rId9"/>
-    <p:sldId id="261" r:id="rId10"/>
-    <p:sldId id="262" r:id="rId11"/>
-    <p:sldId id="268" r:id="rId12"/>
-    <p:sldId id="264" r:id="rId13"/>
+    <p:sldId id="269" r:id="rId4"/>
+    <p:sldId id="265" r:id="rId5"/>
+    <p:sldId id="266" r:id="rId6"/>
+    <p:sldId id="267" r:id="rId7"/>
+    <p:sldId id="258" r:id="rId8"/>
+    <p:sldId id="259" r:id="rId9"/>
+    <p:sldId id="260" r:id="rId10"/>
+    <p:sldId id="271" r:id="rId11"/>
+    <p:sldId id="261" r:id="rId12"/>
+    <p:sldId id="270" r:id="rId13"/>
+    <p:sldId id="262" r:id="rId14"/>
+    <p:sldId id="268" r:id="rId15"/>
+    <p:sldId id="264" r:id="rId16"/>
   </p:sldIdLst>
   <p:sldSz cx="9144000" cy="5143500" type="screen16x9"/>
   <p:notesSz cx="6858000" cy="9144000"/>
   <p:embeddedFontLst>
     <p:embeddedFont>
       <p:font typeface="Lato" panose="020F0502020204030203" pitchFamily="34" charset="0"/>
-      <p:regular r:id="rId16"/>
-      <p:bold r:id="rId17"/>
-      <p:italic r:id="rId18"/>
-      <p:boldItalic r:id="rId19"/>
+      <p:regular r:id="rId19"/>
+      <p:bold r:id="rId20"/>
+      <p:italic r:id="rId21"/>
+      <p:boldItalic r:id="rId22"/>
     </p:embeddedFont>
     <p:embeddedFont>
       <p:font typeface="Lato Black" panose="020F0502020204030203" pitchFamily="34" charset="0"/>
-      <p:bold r:id="rId20"/>
-      <p:boldItalic r:id="rId21"/>
+      <p:bold r:id="rId23"/>
+      <p:boldItalic r:id="rId24"/>
     </p:embeddedFont>
   </p:embeddedFontLst>
   <p:defaultTextStyle>
@@ -703,7 +706,7 @@
           <a:p>
             <a:fld id="{107C0E2D-9FE8-4FBC-B5FD-B5207E23AA1E}" type="datetimeFigureOut">
               <a:rPr lang="en-US" smtClean="0"/>
-              <a:t>6/19/2022</a:t>
+              <a:t>6/28/2022</a:t>
             </a:fld>
             <a:endParaRPr lang="en-US"/>
           </a:p>
@@ -1350,7 +1353,7 @@
   <p:cSld>
     <p:spTree>
       <p:nvGrpSpPr>
-        <p:cNvPr id="1" name="Shape 295"/>
+        <p:cNvPr id="1" name="Shape 283"/>
         <p:cNvGrpSpPr/>
         <p:nvPr/>
       </p:nvGrpSpPr>
@@ -1364,7 +1367,7 @@
       </p:grpSpPr>
       <p:sp>
         <p:nvSpPr>
-          <p:cNvPr id="296" name="Google Shape;296;g109c86d75a5_0_7:notes"/>
+          <p:cNvPr id="284" name="Google Shape;284;ga3aec4a575_0_11:notes"/>
           <p:cNvSpPr>
             <a:spLocks noGrp="1" noRot="1" noChangeAspect="1"/>
           </p:cNvSpPr>
@@ -1405,7 +1408,7 @@
       </p:sp>
       <p:sp>
         <p:nvSpPr>
-          <p:cNvPr id="297" name="Google Shape;297;g109c86d75a5_0_7:notes"/>
+          <p:cNvPr id="285" name="Google Shape;285;ga3aec4a575_0_11:notes"/>
           <p:cNvSpPr txBox="1">
             <a:spLocks noGrp="1"/>
           </p:cNvSpPr>
@@ -1442,6 +1445,11 @@
         </p:txBody>
       </p:sp>
     </p:spTree>
+    <p:extLst>
+      <p:ext uri="{BB962C8B-B14F-4D97-AF65-F5344CB8AC3E}">
+        <p14:creationId xmlns:p14="http://schemas.microsoft.com/office/powerpoint/2010/main" val="2256148574"/>
+      </p:ext>
+    </p:extLst>
   </p:cSld>
   <p:clrMapOvr>
     <a:masterClrMapping/>
@@ -1450,6 +1458,110 @@
 </file>
 
 <file path=ppt/notesSlides/notesSlide11.xml><?xml version="1.0" encoding="utf-8"?>
+<p:notes xmlns:a="http://schemas.openxmlformats.org/drawingml/2006/main" xmlns:r="http://schemas.openxmlformats.org/officeDocument/2006/relationships" xmlns:p="http://schemas.openxmlformats.org/presentationml/2006/main" showMasterSp="0" showMasterPhAnim="0">
+  <p:cSld>
+    <p:spTree>
+      <p:nvGrpSpPr>
+        <p:cNvPr id="1" name="Shape 289"/>
+        <p:cNvGrpSpPr/>
+        <p:nvPr/>
+      </p:nvGrpSpPr>
+      <p:grpSpPr>
+        <a:xfrm>
+          <a:off x="0" y="0"/>
+          <a:ext cx="0" cy="0"/>
+          <a:chOff x="0" y="0"/>
+          <a:chExt cx="0" cy="0"/>
+        </a:xfrm>
+      </p:grpSpPr>
+      <p:sp>
+        <p:nvSpPr>
+          <p:cNvPr id="290" name="Google Shape;290;ga3aec4a575_0_21:notes"/>
+          <p:cNvSpPr>
+            <a:spLocks noGrp="1" noRot="1" noChangeAspect="1"/>
+          </p:cNvSpPr>
+          <p:nvPr>
+            <p:ph type="sldImg" idx="2"/>
+          </p:nvPr>
+        </p:nvSpPr>
+        <p:spPr>
+          <a:xfrm>
+            <a:off x="381000" y="685800"/>
+            <a:ext cx="6096000" cy="3429000"/>
+          </a:xfrm>
+          <a:custGeom>
+            <a:avLst/>
+            <a:gdLst/>
+            <a:ahLst/>
+            <a:cxnLst/>
+            <a:rect l="l" t="t" r="r" b="b"/>
+            <a:pathLst>
+              <a:path w="120000" h="120000" extrusionOk="0">
+                <a:moveTo>
+                  <a:pt x="0" y="0"/>
+                </a:moveTo>
+                <a:lnTo>
+                  <a:pt x="120000" y="0"/>
+                </a:lnTo>
+                <a:lnTo>
+                  <a:pt x="120000" y="120000"/>
+                </a:lnTo>
+                <a:lnTo>
+                  <a:pt x="0" y="120000"/>
+                </a:lnTo>
+                <a:close/>
+              </a:path>
+            </a:pathLst>
+          </a:custGeom>
+        </p:spPr>
+      </p:sp>
+      <p:sp>
+        <p:nvSpPr>
+          <p:cNvPr id="291" name="Google Shape;291;ga3aec4a575_0_21:notes"/>
+          <p:cNvSpPr txBox="1">
+            <a:spLocks noGrp="1"/>
+          </p:cNvSpPr>
+          <p:nvPr>
+            <p:ph type="body" idx="1"/>
+          </p:nvPr>
+        </p:nvSpPr>
+        <p:spPr>
+          <a:xfrm>
+            <a:off x="685800" y="4343400"/>
+            <a:ext cx="5486400" cy="4114800"/>
+          </a:xfrm>
+          <a:prstGeom prst="rect">
+            <a:avLst/>
+          </a:prstGeom>
+        </p:spPr>
+        <p:txBody>
+          <a:bodyPr spcFirstLastPara="1" wrap="square" lIns="91425" tIns="91425" rIns="91425" bIns="91425" anchor="t" anchorCtr="0">
+            <a:noAutofit/>
+          </a:bodyPr>
+          <a:lstStyle/>
+          <a:p>
+            <a:pPr marL="0" lvl="0" indent="0" algn="l" rtl="0">
+              <a:spcBef>
+                <a:spcPts val="0"/>
+              </a:spcBef>
+              <a:spcAft>
+                <a:spcPts val="0"/>
+              </a:spcAft>
+              <a:buNone/>
+            </a:pPr>
+            <a:endParaRPr/>
+          </a:p>
+        </p:txBody>
+      </p:sp>
+    </p:spTree>
+  </p:cSld>
+  <p:clrMapOvr>
+    <a:masterClrMapping/>
+  </p:clrMapOvr>
+</p:notes>
+</file>
+
+<file path=ppt/notesSlides/notesSlide12.xml><?xml version="1.0" encoding="utf-8"?>
 <p:notes xmlns:a="http://schemas.openxmlformats.org/drawingml/2006/main" xmlns:r="http://schemas.openxmlformats.org/officeDocument/2006/relationships" xmlns:p="http://schemas.openxmlformats.org/presentationml/2006/main" showMasterSp="0" showMasterPhAnim="0">
   <p:cSld>
     <p:spTree>
@@ -1546,6 +1658,110 @@
         </p:txBody>
       </p:sp>
     </p:spTree>
+  </p:cSld>
+  <p:clrMapOvr>
+    <a:masterClrMapping/>
+  </p:clrMapOvr>
+</p:notes>
+</file>
+
+<file path=ppt/notesSlides/notesSlide13.xml><?xml version="1.0" encoding="utf-8"?>
+<p:notes xmlns:a="http://schemas.openxmlformats.org/drawingml/2006/main" xmlns:r="http://schemas.openxmlformats.org/officeDocument/2006/relationships" xmlns:p="http://schemas.openxmlformats.org/presentationml/2006/main" showMasterSp="0" showMasterPhAnim="0">
+  <p:cSld>
+    <p:spTree>
+      <p:nvGrpSpPr>
+        <p:cNvPr id="1" name="Shape 295"/>
+        <p:cNvGrpSpPr/>
+        <p:nvPr/>
+      </p:nvGrpSpPr>
+      <p:grpSpPr>
+        <a:xfrm>
+          <a:off x="0" y="0"/>
+          <a:ext cx="0" cy="0"/>
+          <a:chOff x="0" y="0"/>
+          <a:chExt cx="0" cy="0"/>
+        </a:xfrm>
+      </p:grpSpPr>
+      <p:sp>
+        <p:nvSpPr>
+          <p:cNvPr id="296" name="Google Shape;296;g109c86d75a5_0_7:notes"/>
+          <p:cNvSpPr>
+            <a:spLocks noGrp="1" noRot="1" noChangeAspect="1"/>
+          </p:cNvSpPr>
+          <p:nvPr>
+            <p:ph type="sldImg" idx="2"/>
+          </p:nvPr>
+        </p:nvSpPr>
+        <p:spPr>
+          <a:xfrm>
+            <a:off x="381000" y="685800"/>
+            <a:ext cx="6096000" cy="3429000"/>
+          </a:xfrm>
+          <a:custGeom>
+            <a:avLst/>
+            <a:gdLst/>
+            <a:ahLst/>
+            <a:cxnLst/>
+            <a:rect l="l" t="t" r="r" b="b"/>
+            <a:pathLst>
+              <a:path w="120000" h="120000" extrusionOk="0">
+                <a:moveTo>
+                  <a:pt x="0" y="0"/>
+                </a:moveTo>
+                <a:lnTo>
+                  <a:pt x="120000" y="0"/>
+                </a:lnTo>
+                <a:lnTo>
+                  <a:pt x="120000" y="120000"/>
+                </a:lnTo>
+                <a:lnTo>
+                  <a:pt x="0" y="120000"/>
+                </a:lnTo>
+                <a:close/>
+              </a:path>
+            </a:pathLst>
+          </a:custGeom>
+        </p:spPr>
+      </p:sp>
+      <p:sp>
+        <p:nvSpPr>
+          <p:cNvPr id="297" name="Google Shape;297;g109c86d75a5_0_7:notes"/>
+          <p:cNvSpPr txBox="1">
+            <a:spLocks noGrp="1"/>
+          </p:cNvSpPr>
+          <p:nvPr>
+            <p:ph type="body" idx="1"/>
+          </p:nvPr>
+        </p:nvSpPr>
+        <p:spPr>
+          <a:xfrm>
+            <a:off x="685800" y="4343400"/>
+            <a:ext cx="5486400" cy="4114800"/>
+          </a:xfrm>
+          <a:prstGeom prst="rect">
+            <a:avLst/>
+          </a:prstGeom>
+        </p:spPr>
+        <p:txBody>
+          <a:bodyPr spcFirstLastPara="1" wrap="square" lIns="91425" tIns="91425" rIns="91425" bIns="91425" anchor="t" anchorCtr="0">
+            <a:noAutofit/>
+          </a:bodyPr>
+          <a:lstStyle/>
+          <a:p>
+            <a:pPr marL="0" lvl="0" indent="0" algn="l" rtl="0">
+              <a:spcBef>
+                <a:spcPts val="0"/>
+              </a:spcBef>
+              <a:spcAft>
+                <a:spcPts val="0"/>
+              </a:spcAft>
+              <a:buNone/>
+            </a:pPr>
+            <a:endParaRPr/>
+          </a:p>
+        </p:txBody>
+      </p:sp>
+    </p:spTree>
     <p:extLst>
       <p:ext uri="{BB962C8B-B14F-4D97-AF65-F5344CB8AC3E}">
         <p14:creationId xmlns:p14="http://schemas.microsoft.com/office/powerpoint/2010/main" val="456280849"/>
@@ -1558,7 +1774,7 @@
 </p:notes>
 </file>
 
-<file path=ppt/notesSlides/notesSlide12.xml><?xml version="1.0" encoding="utf-8"?>
+<file path=ppt/notesSlides/notesSlide14.xml><?xml version="1.0" encoding="utf-8"?>
 <p:notes xmlns:a="http://schemas.openxmlformats.org/drawingml/2006/main" xmlns:r="http://schemas.openxmlformats.org/officeDocument/2006/relationships" xmlns:p="http://schemas.openxmlformats.org/presentationml/2006/main" showMasterSp="0" showMasterPhAnim="0">
   <p:cSld>
     <p:spTree>
@@ -1865,7 +2081,7 @@
     </p:spTree>
     <p:extLst>
       <p:ext uri="{BB962C8B-B14F-4D97-AF65-F5344CB8AC3E}">
-        <p14:creationId xmlns:p14="http://schemas.microsoft.com/office/powerpoint/2010/main" val="3405783905"/>
+        <p14:creationId xmlns:p14="http://schemas.microsoft.com/office/powerpoint/2010/main" val="1386388170"/>
       </p:ext>
     </p:extLst>
   </p:cSld>
@@ -1967,14 +2183,14 @@
               </a:spcAft>
               <a:buNone/>
             </a:pPr>
-            <a:endParaRPr dirty="0"/>
+            <a:endParaRPr/>
           </a:p>
         </p:txBody>
       </p:sp>
     </p:spTree>
     <p:extLst>
       <p:ext uri="{BB962C8B-B14F-4D97-AF65-F5344CB8AC3E}">
-        <p14:creationId xmlns:p14="http://schemas.microsoft.com/office/powerpoint/2010/main" val="2761290453"/>
+        <p14:creationId xmlns:p14="http://schemas.microsoft.com/office/powerpoint/2010/main" val="3405783905"/>
       </p:ext>
     </p:extLst>
   </p:cSld>
@@ -2076,6 +2292,115 @@
               </a:spcAft>
               <a:buNone/>
             </a:pPr>
+            <a:endParaRPr dirty="0"/>
+          </a:p>
+        </p:txBody>
+      </p:sp>
+    </p:spTree>
+    <p:extLst>
+      <p:ext uri="{BB962C8B-B14F-4D97-AF65-F5344CB8AC3E}">
+        <p14:creationId xmlns:p14="http://schemas.microsoft.com/office/powerpoint/2010/main" val="2761290453"/>
+      </p:ext>
+    </p:extLst>
+  </p:cSld>
+  <p:clrMapOvr>
+    <a:masterClrMapping/>
+  </p:clrMapOvr>
+</p:notes>
+</file>
+
+<file path=ppt/notesSlides/notesSlide6.xml><?xml version="1.0" encoding="utf-8"?>
+<p:notes xmlns:a="http://schemas.openxmlformats.org/drawingml/2006/main" xmlns:r="http://schemas.openxmlformats.org/officeDocument/2006/relationships" xmlns:p="http://schemas.openxmlformats.org/presentationml/2006/main" showMasterSp="0" showMasterPhAnim="0">
+  <p:cSld>
+    <p:spTree>
+      <p:nvGrpSpPr>
+        <p:cNvPr id="1" name="Shape 265"/>
+        <p:cNvGrpSpPr/>
+        <p:nvPr/>
+      </p:nvGrpSpPr>
+      <p:grpSpPr>
+        <a:xfrm>
+          <a:off x="0" y="0"/>
+          <a:ext cx="0" cy="0"/>
+          <a:chOff x="0" y="0"/>
+          <a:chExt cx="0" cy="0"/>
+        </a:xfrm>
+      </p:grpSpPr>
+      <p:sp>
+        <p:nvSpPr>
+          <p:cNvPr id="266" name="Google Shape;266;g5a72773890_1_5:notes"/>
+          <p:cNvSpPr>
+            <a:spLocks noGrp="1" noRot="1" noChangeAspect="1"/>
+          </p:cNvSpPr>
+          <p:nvPr>
+            <p:ph type="sldImg" idx="2"/>
+          </p:nvPr>
+        </p:nvSpPr>
+        <p:spPr>
+          <a:xfrm>
+            <a:off x="381000" y="685800"/>
+            <a:ext cx="6096000" cy="3429000"/>
+          </a:xfrm>
+          <a:custGeom>
+            <a:avLst/>
+            <a:gdLst/>
+            <a:ahLst/>
+            <a:cxnLst/>
+            <a:rect l="l" t="t" r="r" b="b"/>
+            <a:pathLst>
+              <a:path w="120000" h="120000" extrusionOk="0">
+                <a:moveTo>
+                  <a:pt x="0" y="0"/>
+                </a:moveTo>
+                <a:lnTo>
+                  <a:pt x="120000" y="0"/>
+                </a:lnTo>
+                <a:lnTo>
+                  <a:pt x="120000" y="120000"/>
+                </a:lnTo>
+                <a:lnTo>
+                  <a:pt x="0" y="120000"/>
+                </a:lnTo>
+                <a:close/>
+              </a:path>
+            </a:pathLst>
+          </a:custGeom>
+        </p:spPr>
+      </p:sp>
+      <p:sp>
+        <p:nvSpPr>
+          <p:cNvPr id="267" name="Google Shape;267;g5a72773890_1_5:notes"/>
+          <p:cNvSpPr txBox="1">
+            <a:spLocks noGrp="1"/>
+          </p:cNvSpPr>
+          <p:nvPr>
+            <p:ph type="body" idx="1"/>
+          </p:nvPr>
+        </p:nvSpPr>
+        <p:spPr>
+          <a:xfrm>
+            <a:off x="685800" y="4343400"/>
+            <a:ext cx="5486400" cy="4114800"/>
+          </a:xfrm>
+          <a:prstGeom prst="rect">
+            <a:avLst/>
+          </a:prstGeom>
+        </p:spPr>
+        <p:txBody>
+          <a:bodyPr spcFirstLastPara="1" wrap="square" lIns="91425" tIns="91425" rIns="91425" bIns="91425" anchor="t" anchorCtr="0">
+            <a:noAutofit/>
+          </a:bodyPr>
+          <a:lstStyle/>
+          <a:p>
+            <a:pPr marL="0" lvl="0" indent="0" algn="l" rtl="0">
+              <a:spcBef>
+                <a:spcPts val="0"/>
+              </a:spcBef>
+              <a:spcAft>
+                <a:spcPts val="0"/>
+              </a:spcAft>
+              <a:buNone/>
+            </a:pPr>
             <a:endParaRPr/>
           </a:p>
         </p:txBody>
@@ -2093,7 +2418,7 @@
 </p:notes>
 </file>
 
-<file path=ppt/notesSlides/notesSlide6.xml><?xml version="1.0" encoding="utf-8"?>
+<file path=ppt/notesSlides/notesSlide7.xml><?xml version="1.0" encoding="utf-8"?>
 <p:notes xmlns:a="http://schemas.openxmlformats.org/drawingml/2006/main" xmlns:r="http://schemas.openxmlformats.org/officeDocument/2006/relationships" xmlns:p="http://schemas.openxmlformats.org/presentationml/2006/main" showMasterSp="0" showMasterPhAnim="0">
   <p:cSld>
     <p:spTree>
@@ -2197,7 +2522,7 @@
 </p:notes>
 </file>
 
-<file path=ppt/notesSlides/notesSlide7.xml><?xml version="1.0" encoding="utf-8"?>
+<file path=ppt/notesSlides/notesSlide8.xml><?xml version="1.0" encoding="utf-8"?>
 <p:notes xmlns:a="http://schemas.openxmlformats.org/drawingml/2006/main" xmlns:r="http://schemas.openxmlformats.org/officeDocument/2006/relationships" xmlns:p="http://schemas.openxmlformats.org/presentationml/2006/main" showMasterSp="0" showMasterPhAnim="0">
   <p:cSld>
     <p:spTree>
@@ -2301,7 +2626,7 @@
 </p:notes>
 </file>
 
-<file path=ppt/notesSlides/notesSlide8.xml><?xml version="1.0" encoding="utf-8"?>
+<file path=ppt/notesSlides/notesSlide9.xml><?xml version="1.0" encoding="utf-8"?>
 <p:notes xmlns:a="http://schemas.openxmlformats.org/drawingml/2006/main" xmlns:r="http://schemas.openxmlformats.org/officeDocument/2006/relationships" xmlns:p="http://schemas.openxmlformats.org/presentationml/2006/main" showMasterSp="0" showMasterPhAnim="0">
   <p:cSld>
     <p:spTree>
@@ -2362,110 +2687,6 @@
       <p:sp>
         <p:nvSpPr>
           <p:cNvPr id="285" name="Google Shape;285;ga3aec4a575_0_11:notes"/>
-          <p:cNvSpPr txBox="1">
-            <a:spLocks noGrp="1"/>
-          </p:cNvSpPr>
-          <p:nvPr>
-            <p:ph type="body" idx="1"/>
-          </p:nvPr>
-        </p:nvSpPr>
-        <p:spPr>
-          <a:xfrm>
-            <a:off x="685800" y="4343400"/>
-            <a:ext cx="5486400" cy="4114800"/>
-          </a:xfrm>
-          <a:prstGeom prst="rect">
-            <a:avLst/>
-          </a:prstGeom>
-        </p:spPr>
-        <p:txBody>
-          <a:bodyPr spcFirstLastPara="1" wrap="square" lIns="91425" tIns="91425" rIns="91425" bIns="91425" anchor="t" anchorCtr="0">
-            <a:noAutofit/>
-          </a:bodyPr>
-          <a:lstStyle/>
-          <a:p>
-            <a:pPr marL="0" lvl="0" indent="0" algn="l" rtl="0">
-              <a:spcBef>
-                <a:spcPts val="0"/>
-              </a:spcBef>
-              <a:spcAft>
-                <a:spcPts val="0"/>
-              </a:spcAft>
-              <a:buNone/>
-            </a:pPr>
-            <a:endParaRPr/>
-          </a:p>
-        </p:txBody>
-      </p:sp>
-    </p:spTree>
-  </p:cSld>
-  <p:clrMapOvr>
-    <a:masterClrMapping/>
-  </p:clrMapOvr>
-</p:notes>
-</file>
-
-<file path=ppt/notesSlides/notesSlide9.xml><?xml version="1.0" encoding="utf-8"?>
-<p:notes xmlns:a="http://schemas.openxmlformats.org/drawingml/2006/main" xmlns:r="http://schemas.openxmlformats.org/officeDocument/2006/relationships" xmlns:p="http://schemas.openxmlformats.org/presentationml/2006/main" showMasterSp="0" showMasterPhAnim="0">
-  <p:cSld>
-    <p:spTree>
-      <p:nvGrpSpPr>
-        <p:cNvPr id="1" name="Shape 289"/>
-        <p:cNvGrpSpPr/>
-        <p:nvPr/>
-      </p:nvGrpSpPr>
-      <p:grpSpPr>
-        <a:xfrm>
-          <a:off x="0" y="0"/>
-          <a:ext cx="0" cy="0"/>
-          <a:chOff x="0" y="0"/>
-          <a:chExt cx="0" cy="0"/>
-        </a:xfrm>
-      </p:grpSpPr>
-      <p:sp>
-        <p:nvSpPr>
-          <p:cNvPr id="290" name="Google Shape;290;ga3aec4a575_0_21:notes"/>
-          <p:cNvSpPr>
-            <a:spLocks noGrp="1" noRot="1" noChangeAspect="1"/>
-          </p:cNvSpPr>
-          <p:nvPr>
-            <p:ph type="sldImg" idx="2"/>
-          </p:nvPr>
-        </p:nvSpPr>
-        <p:spPr>
-          <a:xfrm>
-            <a:off x="381000" y="685800"/>
-            <a:ext cx="6096000" cy="3429000"/>
-          </a:xfrm>
-          <a:custGeom>
-            <a:avLst/>
-            <a:gdLst/>
-            <a:ahLst/>
-            <a:cxnLst/>
-            <a:rect l="l" t="t" r="r" b="b"/>
-            <a:pathLst>
-              <a:path w="120000" h="120000" extrusionOk="0">
-                <a:moveTo>
-                  <a:pt x="0" y="0"/>
-                </a:moveTo>
-                <a:lnTo>
-                  <a:pt x="120000" y="0"/>
-                </a:lnTo>
-                <a:lnTo>
-                  <a:pt x="120000" y="120000"/>
-                </a:lnTo>
-                <a:lnTo>
-                  <a:pt x="0" y="120000"/>
-                </a:lnTo>
-                <a:close/>
-              </a:path>
-            </a:pathLst>
-          </a:custGeom>
-        </p:spPr>
-      </p:sp>
-      <p:sp>
-        <p:nvSpPr>
-          <p:cNvPr id="291" name="Google Shape;291;ga3aec4a575_0_21:notes"/>
           <p:cNvSpPr txBox="1">
             <a:spLocks noGrp="1"/>
           </p:cNvSpPr>
@@ -16802,7 +17023,7 @@
   <p:cSld>
     <p:spTree>
       <p:nvGrpSpPr>
-        <p:cNvPr id="1" name="Shape 298"/>
+        <p:cNvPr id="1" name="Shape 286"/>
         <p:cNvGrpSpPr/>
         <p:nvPr/>
       </p:nvGrpSpPr>
@@ -16816,7 +17037,7 @@
       </p:grpSpPr>
       <p:sp>
         <p:nvSpPr>
-          <p:cNvPr id="299" name="Google Shape;299;p46"/>
+          <p:cNvPr id="287" name="Google Shape;287;p44"/>
           <p:cNvSpPr txBox="1">
             <a:spLocks noGrp="1"/>
           </p:cNvSpPr>
@@ -16826,8 +17047,8 @@
         </p:nvSpPr>
         <p:spPr>
           <a:xfrm>
-            <a:off x="494617" y="229550"/>
-            <a:ext cx="5647500" cy="576000"/>
+            <a:off x="494629" y="229550"/>
+            <a:ext cx="8280000" cy="576000"/>
           </a:xfrm>
           <a:prstGeom prst="rect">
             <a:avLst/>
@@ -16849,19 +17070,411 @@
               <a:buNone/>
             </a:pPr>
             <a:r>
-              <a:rPr lang="en" sz="2000"/>
-              <a:t>Future Vision</a:t>
+              <a:rPr lang="en-US" sz="2000" dirty="0"/>
+              <a:t>Key Metrics</a:t>
             </a:r>
-            <a:endParaRPr sz="2000"/>
+            <a:endParaRPr sz="2000" dirty="0"/>
           </a:p>
         </p:txBody>
       </p:sp>
       <p:sp>
         <p:nvSpPr>
-          <p:cNvPr id="4" name="Google Shape;294;p45">
+          <p:cNvPr id="288" name="Google Shape;288;p44"/>
+          <p:cNvSpPr txBox="1"/>
+          <p:nvPr/>
+        </p:nvSpPr>
+        <p:spPr>
+          <a:xfrm>
+            <a:off x="512375" y="1151300"/>
+            <a:ext cx="8238600" cy="3414300"/>
+          </a:xfrm>
+          <a:prstGeom prst="rect">
+            <a:avLst/>
+          </a:prstGeom>
+          <a:noFill/>
+          <a:ln>
+            <a:noFill/>
+          </a:ln>
+        </p:spPr>
+        <p:txBody>
+          <a:bodyPr spcFirstLastPara="1" wrap="square" lIns="91425" tIns="91425" rIns="91425" bIns="91425" anchor="t" anchorCtr="0">
+            <a:noAutofit/>
+          </a:bodyPr>
+          <a:lstStyle>
+            <a:defPPr marR="0" lvl="0" algn="l" rtl="0">
+              <a:lnSpc>
+                <a:spcPct val="100000"/>
+              </a:lnSpc>
+              <a:spcBef>
+                <a:spcPts val="0"/>
+              </a:spcBef>
+              <a:spcAft>
+                <a:spcPts val="0"/>
+              </a:spcAft>
+            </a:defPPr>
+            <a:lvl1pPr marL="285750" indent="-285750">
+              <a:buFont typeface="Arial" panose="020B0604020202020204" pitchFamily="34" charset="0"/>
+              <a:buChar char="•"/>
+              <a:defRPr>
+                <a:solidFill>
+                  <a:srgbClr val="222222"/>
+                </a:solidFill>
+                <a:highlight>
+                  <a:srgbClr val="FFFFFF"/>
+                </a:highlight>
+                <a:latin typeface="Lato"/>
+                <a:ea typeface="Lato"/>
+                <a:cs typeface="Lato"/>
+              </a:defRPr>
+            </a:lvl1pPr>
+          </a:lstStyle>
+          <a:p>
+            <a:r>
+              <a:rPr lang="en-US" dirty="0"/>
+              <a:t>7-8M .NET developers</a:t>
+            </a:r>
+            <a:endParaRPr lang="en-US" dirty="0">
+              <a:sym typeface="Lato"/>
+            </a:endParaRPr>
+          </a:p>
+          <a:p>
+            <a:endParaRPr lang="en-US" dirty="0">
+              <a:sym typeface="Lato"/>
+            </a:endParaRPr>
+          </a:p>
+          <a:p>
+            <a:r>
+              <a:rPr lang="en-US" dirty="0">
+                <a:sym typeface="Lato"/>
+              </a:rPr>
+              <a:t>T</a:t>
+            </a:r>
+            <a:r>
+              <a:rPr lang="en-US" dirty="0"/>
+              <a:t>ens of thousands of companies using .NET</a:t>
+            </a:r>
+          </a:p>
+          <a:p>
+            <a:endParaRPr lang="en-US" dirty="0">
+              <a:sym typeface="Lato"/>
+            </a:endParaRPr>
+          </a:p>
+          <a:p>
+            <a:r>
+              <a:rPr lang="en-US" dirty="0"/>
+              <a:t>Forge Trust: A multi-billion dollar financial platform using </a:t>
+            </a:r>
+            <a:r>
+              <a:rPr lang="en-US" dirty="0" err="1"/>
+              <a:t>ASPSecurityKit</a:t>
+            </a:r>
+            <a:endParaRPr lang="en-US" dirty="0">
+              <a:sym typeface="Lato"/>
+            </a:endParaRPr>
+          </a:p>
+          <a:p>
+            <a:endParaRPr dirty="0">
+              <a:sym typeface="Lato"/>
+            </a:endParaRPr>
+          </a:p>
+        </p:txBody>
+      </p:sp>
+    </p:spTree>
+    <p:extLst>
+      <p:ext uri="{BB962C8B-B14F-4D97-AF65-F5344CB8AC3E}">
+        <p14:creationId xmlns:p14="http://schemas.microsoft.com/office/powerpoint/2010/main" val="3017318791"/>
+      </p:ext>
+    </p:extLst>
+  </p:cSld>
+  <p:clrMapOvr>
+    <a:masterClrMapping/>
+  </p:clrMapOvr>
+</p:sld>
+</file>
+
+<file path=ppt/slides/slide11.xml><?xml version="1.0" encoding="utf-8"?>
+<p:sld xmlns:a="http://schemas.openxmlformats.org/drawingml/2006/main" xmlns:r="http://schemas.openxmlformats.org/officeDocument/2006/relationships" xmlns:p="http://schemas.openxmlformats.org/presentationml/2006/main">
+  <p:cSld>
+    <p:spTree>
+      <p:nvGrpSpPr>
+        <p:cNvPr id="1" name="Shape 292"/>
+        <p:cNvGrpSpPr/>
+        <p:nvPr/>
+      </p:nvGrpSpPr>
+      <p:grpSpPr>
+        <a:xfrm>
+          <a:off x="0" y="0"/>
+          <a:ext cx="0" cy="0"/>
+          <a:chOff x="0" y="0"/>
+          <a:chExt cx="0" cy="0"/>
+        </a:xfrm>
+      </p:grpSpPr>
+      <p:sp>
+        <p:nvSpPr>
+          <p:cNvPr id="293" name="Google Shape;293;p45"/>
+          <p:cNvSpPr txBox="1">
+            <a:spLocks noGrp="1"/>
+          </p:cNvSpPr>
+          <p:nvPr>
+            <p:ph type="title"/>
+          </p:nvPr>
+        </p:nvSpPr>
+        <p:spPr>
+          <a:xfrm>
+            <a:off x="494629" y="229550"/>
+            <a:ext cx="8280000" cy="576000"/>
+          </a:xfrm>
+          <a:prstGeom prst="rect">
+            <a:avLst/>
+          </a:prstGeom>
+        </p:spPr>
+        <p:txBody>
+          <a:bodyPr spcFirstLastPara="1" wrap="square" lIns="91425" tIns="91425" rIns="91425" bIns="91425" anchor="t" anchorCtr="0">
+            <a:noAutofit/>
+          </a:bodyPr>
+          <a:lstStyle/>
+          <a:p>
+            <a:pPr marL="0" lvl="0" indent="0" algn="l" rtl="0">
+              <a:spcBef>
+                <a:spcPts val="0"/>
+              </a:spcBef>
+              <a:spcAft>
+                <a:spcPts val="0"/>
+              </a:spcAft>
+              <a:buNone/>
+            </a:pPr>
+            <a:r>
+              <a:rPr lang="en" sz="2000">
+                <a:solidFill>
+                  <a:srgbClr val="222222"/>
+                </a:solidFill>
+                <a:highlight>
+                  <a:srgbClr val="FFFFFF"/>
+                </a:highlight>
+              </a:rPr>
+              <a:t>Key Differentiators &amp; Adoption Plan</a:t>
+            </a:r>
+            <a:endParaRPr sz="2000"/>
+          </a:p>
+        </p:txBody>
+      </p:sp>
+      <p:sp>
+        <p:nvSpPr>
+          <p:cNvPr id="294" name="Google Shape;294;p45"/>
+          <p:cNvSpPr txBox="1"/>
+          <p:nvPr/>
+        </p:nvSpPr>
+        <p:spPr>
+          <a:xfrm>
+            <a:off x="512375" y="1151300"/>
+            <a:ext cx="8238600" cy="3414300"/>
+          </a:xfrm>
+          <a:prstGeom prst="rect">
+            <a:avLst/>
+          </a:prstGeom>
+          <a:noFill/>
+          <a:ln>
+            <a:noFill/>
+          </a:ln>
+        </p:spPr>
+        <p:txBody>
+          <a:bodyPr spcFirstLastPara="1" wrap="square" lIns="91425" tIns="91425" rIns="91425" bIns="91425" anchor="t" anchorCtr="0">
+            <a:noAutofit/>
+          </a:bodyPr>
+          <a:lstStyle/>
+          <a:p>
+            <a:pPr marL="285750" lvl="0" indent="-285750" algn="l" rtl="0">
+              <a:spcBef>
+                <a:spcPts val="0"/>
+              </a:spcBef>
+              <a:spcAft>
+                <a:spcPts val="0"/>
+              </a:spcAft>
+              <a:buFont typeface="Arial" panose="020B0604020202020204" pitchFamily="34" charset="0"/>
+              <a:buChar char="•"/>
+            </a:pPr>
+            <a:r>
+              <a:rPr lang="en-US" dirty="0">
+                <a:latin typeface="Lato"/>
+                <a:ea typeface="Lato"/>
+                <a:cs typeface="Lato"/>
+                <a:sym typeface="Lato"/>
+              </a:rPr>
+              <a:t>To get started within minutes with ASPSecurityKit, we provide supplementary products called source packages, that give source implementation of profile/user management/admin portals and APIs, built on ASK framework, to save time developing these from scratch. This also enables teams to get started with business features of the prototype/product quickly. </a:t>
+            </a:r>
+          </a:p>
+          <a:p>
+            <a:pPr marL="285750" lvl="0" indent="-285750" algn="l" rtl="0">
+              <a:spcBef>
+                <a:spcPts val="0"/>
+              </a:spcBef>
+              <a:spcAft>
+                <a:spcPts val="0"/>
+              </a:spcAft>
+              <a:buFont typeface="Arial" panose="020B0604020202020204" pitchFamily="34" charset="0"/>
+              <a:buChar char="•"/>
+            </a:pPr>
+            <a:endParaRPr lang="en-US" dirty="0">
+              <a:latin typeface="Lato"/>
+              <a:ea typeface="Lato"/>
+              <a:cs typeface="Lato"/>
+              <a:sym typeface="Lato"/>
+            </a:endParaRPr>
+          </a:p>
+          <a:p>
+            <a:pPr marL="285750" lvl="0" indent="-285750" algn="l" rtl="0">
+              <a:spcBef>
+                <a:spcPts val="0"/>
+              </a:spcBef>
+              <a:spcAft>
+                <a:spcPts val="0"/>
+              </a:spcAft>
+              <a:buFont typeface="Arial" panose="020B0604020202020204" pitchFamily="34" charset="0"/>
+              <a:buChar char="•"/>
+            </a:pPr>
+            <a:r>
+              <a:rPr lang="en-US" dirty="0">
+                <a:latin typeface="Lato"/>
+                <a:ea typeface="Lato"/>
+                <a:cs typeface="Lato"/>
+                <a:sym typeface="Lato"/>
+              </a:rPr>
+              <a:t>Different source packages are available to get started with ASK on new or existing projects.</a:t>
+            </a:r>
+          </a:p>
+          <a:p>
+            <a:pPr marL="285750" lvl="0" indent="-285750" algn="l" rtl="0">
+              <a:spcBef>
+                <a:spcPts val="0"/>
+              </a:spcBef>
+              <a:spcAft>
+                <a:spcPts val="0"/>
+              </a:spcAft>
+              <a:buFont typeface="Arial" panose="020B0604020202020204" pitchFamily="34" charset="0"/>
+              <a:buChar char="•"/>
+            </a:pPr>
+            <a:endParaRPr lang="en-US" dirty="0">
+              <a:latin typeface="Lato"/>
+              <a:ea typeface="Lato"/>
+              <a:cs typeface="Lato"/>
+              <a:sym typeface="Lato"/>
+            </a:endParaRPr>
+          </a:p>
+          <a:p>
+            <a:pPr marL="285750" lvl="0" indent="-285750" algn="l" rtl="0">
+              <a:spcBef>
+                <a:spcPts val="0"/>
+              </a:spcBef>
+              <a:spcAft>
+                <a:spcPts val="0"/>
+              </a:spcAft>
+              <a:buFont typeface="Arial" panose="020B0604020202020204" pitchFamily="34" charset="0"/>
+              <a:buChar char="•"/>
+            </a:pPr>
+            <a:r>
+              <a:rPr lang="en-US" dirty="0">
+                <a:latin typeface="Lato"/>
+                <a:ea typeface="Lato"/>
+                <a:cs typeface="Lato"/>
+                <a:sym typeface="Lato"/>
+              </a:rPr>
+              <a:t>A NuGet tool is built that guides user through the process of installing/configuring source packages with ASK.</a:t>
+            </a:r>
+            <a:endParaRPr dirty="0">
+              <a:latin typeface="Lato"/>
+              <a:ea typeface="Lato"/>
+              <a:cs typeface="Lato"/>
+              <a:sym typeface="Lato"/>
+            </a:endParaRPr>
+          </a:p>
+        </p:txBody>
+      </p:sp>
+    </p:spTree>
+  </p:cSld>
+  <p:clrMapOvr>
+    <a:masterClrMapping/>
+  </p:clrMapOvr>
+</p:sld>
+</file>
+
+<file path=ppt/slides/slide12.xml><?xml version="1.0" encoding="utf-8"?>
+<p:sld xmlns:a="http://schemas.openxmlformats.org/drawingml/2006/main" xmlns:r="http://schemas.openxmlformats.org/officeDocument/2006/relationships" xmlns:p="http://schemas.openxmlformats.org/presentationml/2006/main">
+  <p:cSld>
+    <p:spTree>
+      <p:nvGrpSpPr>
+        <p:cNvPr id="1" name=""/>
+        <p:cNvGrpSpPr/>
+        <p:nvPr/>
+      </p:nvGrpSpPr>
+      <p:grpSpPr>
+        <a:xfrm>
+          <a:off x="0" y="0"/>
+          <a:ext cx="0" cy="0"/>
+          <a:chOff x="0" y="0"/>
+          <a:chExt cx="0" cy="0"/>
+        </a:xfrm>
+      </p:grpSpPr>
+      <p:sp>
+        <p:nvSpPr>
+          <p:cNvPr id="5" name="Google Shape;293;p45">
             <a:extLst>
               <a:ext uri="{FF2B5EF4-FFF2-40B4-BE49-F238E27FC236}">
-                <a16:creationId xmlns:a16="http://schemas.microsoft.com/office/drawing/2014/main" id="{55F2A7EE-568D-6D2A-11B1-0A8780450E43}"/>
+                <a16:creationId xmlns:a16="http://schemas.microsoft.com/office/drawing/2014/main" id="{0305A11D-0572-48FF-F9B0-039695AA20A2}"/>
+              </a:ext>
+            </a:extLst>
+          </p:cNvPr>
+          <p:cNvSpPr txBox="1">
+            <a:spLocks noGrp="1"/>
+          </p:cNvSpPr>
+          <p:nvPr>
+            <p:ph type="title"/>
+          </p:nvPr>
+        </p:nvSpPr>
+        <p:spPr>
+          <a:xfrm>
+            <a:off x="494629" y="229550"/>
+            <a:ext cx="8280000" cy="576000"/>
+          </a:xfrm>
+          <a:prstGeom prst="rect">
+            <a:avLst/>
+          </a:prstGeom>
+        </p:spPr>
+        <p:txBody>
+          <a:bodyPr spcFirstLastPara="1" wrap="square" lIns="91425" tIns="91425" rIns="91425" bIns="91425" anchor="t" anchorCtr="0">
+            <a:noAutofit/>
+          </a:bodyPr>
+          <a:lstStyle/>
+          <a:p>
+            <a:pPr marL="0" lvl="0" indent="0" algn="l" rtl="0">
+              <a:spcBef>
+                <a:spcPts val="0"/>
+              </a:spcBef>
+              <a:spcAft>
+                <a:spcPts val="0"/>
+              </a:spcAft>
+              <a:buNone/>
+            </a:pPr>
+            <a:r>
+              <a:rPr lang="en-US" sz="2000" dirty="0">
+                <a:solidFill>
+                  <a:srgbClr val="222222"/>
+                </a:solidFill>
+                <a:highlight>
+                  <a:srgbClr val="FFFFFF"/>
+                </a:highlight>
+              </a:rPr>
+              <a:t>Azure in ASPSecurityKit</a:t>
+            </a:r>
+            <a:endParaRPr sz="2000" dirty="0"/>
+          </a:p>
+        </p:txBody>
+      </p:sp>
+      <p:sp>
+        <p:nvSpPr>
+          <p:cNvPr id="6" name="Google Shape;294;p45">
+            <a:extLst>
+              <a:ext uri="{FF2B5EF4-FFF2-40B4-BE49-F238E27FC236}">
+                <a16:creationId xmlns:a16="http://schemas.microsoft.com/office/drawing/2014/main" id="{FBCC6239-1A13-753E-A75B-EE22BAA716E8}"/>
               </a:ext>
             </a:extLst>
           </p:cNvPr>
@@ -16898,22 +17511,16 @@
               <a:buChar char="•"/>
             </a:pPr>
             <a:r>
-              <a:rPr lang="en-US" dirty="0">
-                <a:latin typeface="Lato"/>
-                <a:ea typeface="Lato"/>
-                <a:cs typeface="Lato"/>
-                <a:sym typeface="Lato"/>
+              <a:rPr lang="en-US" b="0" i="0" dirty="0">
+                <a:solidFill>
+                  <a:srgbClr val="242424"/>
+                </a:solidFill>
+                <a:effectLst/>
+                <a:latin typeface="Lato" panose="020F0502020204030203" pitchFamily="34" charset="0"/>
+                <a:ea typeface="Lato" panose="020F0502020204030203" pitchFamily="34" charset="0"/>
+                <a:cs typeface="Lato" panose="020F0502020204030203" pitchFamily="34" charset="0"/>
               </a:rPr>
-              <a:t>Expanding </a:t>
-            </a:r>
-            <a:r>
-              <a:rPr lang="en-US" dirty="0" err="1">
-                <a:latin typeface="Lato"/>
-                <a:ea typeface="Lato"/>
-                <a:cs typeface="Lato"/>
-                <a:sym typeface="Lato"/>
-              </a:rPr>
-              <a:t>ASPSecurityKit</a:t>
+              <a:t>ASPSecurityKit platform is hosted on Azure</a:t>
             </a:r>
             <a:r>
               <a:rPr lang="en-US" dirty="0">
@@ -16922,7 +17529,7 @@
                 <a:cs typeface="Lato"/>
                 <a:sym typeface="Lato"/>
               </a:rPr>
-              <a:t> to other languages and frameworks</a:t>
+              <a:t>.</a:t>
             </a:r>
           </a:p>
           <a:p>
@@ -16955,24 +17562,132 @@
               <a:buChar char="•"/>
             </a:pPr>
             <a:r>
+              <a:rPr lang="en-US" b="0" i="0" dirty="0">
+                <a:solidFill>
+                  <a:srgbClr val="242424"/>
+                </a:solidFill>
+                <a:effectLst/>
+                <a:latin typeface="Lato" panose="020F0502020204030203" pitchFamily="34" charset="0"/>
+                <a:ea typeface="Lato" panose="020F0502020204030203" pitchFamily="34" charset="0"/>
+                <a:cs typeface="Lato" panose="020F0502020204030203" pitchFamily="34" charset="0"/>
+              </a:rPr>
+              <a:t>Leveraging Azure App Service, Azure SQL and Azure Storage to host the dashboard and the main site</a:t>
+            </a:r>
+            <a:r>
               <a:rPr lang="en-US" dirty="0">
                 <a:latin typeface="Lato"/>
                 <a:ea typeface="Lato"/>
                 <a:cs typeface="Lato"/>
                 <a:sym typeface="Lato"/>
               </a:rPr>
-              <a:t>Building a low-code PaaS to enable people quickly build APIs for mobile apps etc. secured by ASK's pipeline</a:t>
+              <a:t>.</a:t>
             </a:r>
-            <a:endParaRPr dirty="0">
+          </a:p>
+          <a:p>
+            <a:pPr marL="285750" lvl="0" indent="-285750" algn="l" rtl="0">
+              <a:spcBef>
+                <a:spcPts val="0"/>
+              </a:spcBef>
+              <a:spcAft>
+                <a:spcPts val="0"/>
+              </a:spcAft>
+              <a:buFont typeface="Arial" panose="020B0604020202020204" pitchFamily="34" charset="0"/>
+              <a:buChar char="•"/>
+            </a:pPr>
+            <a:endParaRPr lang="en-US" dirty="0">
               <a:latin typeface="Lato"/>
               <a:ea typeface="Lato"/>
               <a:cs typeface="Lato"/>
               <a:sym typeface="Lato"/>
             </a:endParaRPr>
           </a:p>
+          <a:p>
+            <a:pPr marL="285750" lvl="0" indent="-285750" algn="l" rtl="0">
+              <a:spcBef>
+                <a:spcPts val="0"/>
+              </a:spcBef>
+              <a:spcAft>
+                <a:spcPts val="0"/>
+              </a:spcAft>
+              <a:buFont typeface="Arial" panose="020B0604020202020204" pitchFamily="34" charset="0"/>
+              <a:buChar char="•"/>
+            </a:pPr>
+            <a:r>
+              <a:rPr lang="en-US" b="0" i="0" dirty="0">
+                <a:solidFill>
+                  <a:srgbClr val="242424"/>
+                </a:solidFill>
+                <a:effectLst/>
+                <a:latin typeface="Lato" panose="020F0502020204030203" pitchFamily="34" charset="0"/>
+                <a:ea typeface="Lato" panose="020F0502020204030203" pitchFamily="34" charset="0"/>
+                <a:cs typeface="Lato" panose="020F0502020204030203" pitchFamily="34" charset="0"/>
+              </a:rPr>
+              <a:t>Subscriptions, licensing, payments for ASK framework are being managed through the dashboard hosted on Azure</a:t>
+            </a:r>
+            <a:r>
+              <a:rPr lang="en-US" dirty="0">
+                <a:latin typeface="Lato"/>
+                <a:ea typeface="Lato"/>
+                <a:cs typeface="Lato"/>
+                <a:sym typeface="Lato"/>
+              </a:rPr>
+              <a:t>.</a:t>
+            </a:r>
+          </a:p>
+          <a:p>
+            <a:pPr lvl="0" algn="l" rtl="0">
+              <a:spcBef>
+                <a:spcPts val="0"/>
+              </a:spcBef>
+              <a:spcAft>
+                <a:spcPts val="0"/>
+              </a:spcAft>
+            </a:pPr>
+            <a:endParaRPr lang="en-US" dirty="0">
+              <a:latin typeface="Lato"/>
+              <a:ea typeface="Lato"/>
+              <a:cs typeface="Lato"/>
+              <a:sym typeface="Lato"/>
+            </a:endParaRPr>
+          </a:p>
+          <a:p>
+            <a:pPr marL="285750" lvl="0" indent="-285750" algn="l" rtl="0">
+              <a:spcBef>
+                <a:spcPts val="0"/>
+              </a:spcBef>
+              <a:spcAft>
+                <a:spcPts val="0"/>
+              </a:spcAft>
+              <a:buFont typeface="Arial" panose="020B0604020202020204" pitchFamily="34" charset="0"/>
+              <a:buChar char="•"/>
+            </a:pPr>
+            <a:r>
+              <a:rPr lang="en-US" b="0" i="0" dirty="0">
+                <a:solidFill>
+                  <a:srgbClr val="242424"/>
+                </a:solidFill>
+                <a:effectLst/>
+                <a:latin typeface="Lato" panose="020F0502020204030203" pitchFamily="34" charset="0"/>
+                <a:ea typeface="Lato" panose="020F0502020204030203" pitchFamily="34" charset="0"/>
+                <a:cs typeface="Lato" panose="020F0502020204030203" pitchFamily="34" charset="0"/>
+              </a:rPr>
+              <a:t>Source packages are also delivered through an API hosted on the Azure.</a:t>
+            </a:r>
+            <a:endParaRPr dirty="0">
+              <a:latin typeface="Lato" panose="020F0502020204030203" pitchFamily="34" charset="0"/>
+              <a:ea typeface="Lato" panose="020F0502020204030203" pitchFamily="34" charset="0"/>
+              <a:cs typeface="Lato" panose="020F0502020204030203" pitchFamily="34" charset="0"/>
+              <a:sym typeface="Lato"/>
+            </a:endParaRPr>
+          </a:p>
         </p:txBody>
       </p:sp>
     </p:spTree>
+    <p:extLst>
+      <p:ext uri="{BB962C8B-B14F-4D97-AF65-F5344CB8AC3E}">
+        <p14:creationId xmlns:p14="http://schemas.microsoft.com/office/powerpoint/2010/main" val="2925412500"/>
+      </p:ext>
+    </p:extLst>
   </p:cSld>
   <p:clrMapOvr>
     <a:masterClrMapping/>
@@ -16980,7 +17695,7 @@
 </p:sld>
 </file>
 
-<file path=ppt/slides/slide11.xml><?xml version="1.0" encoding="utf-8"?>
+<file path=ppt/slides/slide13.xml><?xml version="1.0" encoding="utf-8"?>
 <p:sld xmlns:a="http://schemas.openxmlformats.org/drawingml/2006/main" xmlns:r="http://schemas.openxmlformats.org/officeDocument/2006/relationships" xmlns:p="http://schemas.openxmlformats.org/presentationml/2006/main">
   <p:cSld>
     <p:spTree>
@@ -17032,6 +17747,171 @@
               <a:buNone/>
             </a:pPr>
             <a:r>
+              <a:rPr lang="en" sz="2000"/>
+              <a:t>Future Vision</a:t>
+            </a:r>
+            <a:endParaRPr sz="2000"/>
+          </a:p>
+        </p:txBody>
+      </p:sp>
+      <p:sp>
+        <p:nvSpPr>
+          <p:cNvPr id="4" name="Google Shape;294;p45">
+            <a:extLst>
+              <a:ext uri="{FF2B5EF4-FFF2-40B4-BE49-F238E27FC236}">
+                <a16:creationId xmlns:a16="http://schemas.microsoft.com/office/drawing/2014/main" id="{55F2A7EE-568D-6D2A-11B1-0A8780450E43}"/>
+              </a:ext>
+            </a:extLst>
+          </p:cNvPr>
+          <p:cNvSpPr txBox="1"/>
+          <p:nvPr/>
+        </p:nvSpPr>
+        <p:spPr>
+          <a:xfrm>
+            <a:off x="512375" y="1151300"/>
+            <a:ext cx="8238600" cy="3414300"/>
+          </a:xfrm>
+          <a:prstGeom prst="rect">
+            <a:avLst/>
+          </a:prstGeom>
+          <a:noFill/>
+          <a:ln>
+            <a:noFill/>
+          </a:ln>
+        </p:spPr>
+        <p:txBody>
+          <a:bodyPr spcFirstLastPara="1" wrap="square" lIns="91425" tIns="91425" rIns="91425" bIns="91425" anchor="t" anchorCtr="0">
+            <a:noAutofit/>
+          </a:bodyPr>
+          <a:lstStyle/>
+          <a:p>
+            <a:pPr marL="285750" lvl="0" indent="-285750" algn="l" rtl="0">
+              <a:spcBef>
+                <a:spcPts val="0"/>
+              </a:spcBef>
+              <a:spcAft>
+                <a:spcPts val="0"/>
+              </a:spcAft>
+              <a:buFont typeface="Arial" panose="020B0604020202020204" pitchFamily="34" charset="0"/>
+              <a:buChar char="•"/>
+            </a:pPr>
+            <a:r>
+              <a:rPr lang="en-US" dirty="0">
+                <a:latin typeface="Lato"/>
+                <a:ea typeface="Lato"/>
+                <a:cs typeface="Lato"/>
+                <a:sym typeface="Lato"/>
+              </a:rPr>
+              <a:t>Expanding ASPSecurityKit to other languages and frameworks</a:t>
+            </a:r>
+          </a:p>
+          <a:p>
+            <a:pPr marL="285750" lvl="0" indent="-285750" algn="l" rtl="0">
+              <a:spcBef>
+                <a:spcPts val="0"/>
+              </a:spcBef>
+              <a:spcAft>
+                <a:spcPts val="0"/>
+              </a:spcAft>
+              <a:buFont typeface="Arial" panose="020B0604020202020204" pitchFamily="34" charset="0"/>
+              <a:buChar char="•"/>
+            </a:pPr>
+            <a:endParaRPr lang="en-US" dirty="0">
+              <a:latin typeface="Lato"/>
+              <a:ea typeface="Lato"/>
+              <a:cs typeface="Lato"/>
+              <a:sym typeface="Lato"/>
+            </a:endParaRPr>
+          </a:p>
+          <a:p>
+            <a:pPr marL="285750" lvl="0" indent="-285750" algn="l" rtl="0">
+              <a:spcBef>
+                <a:spcPts val="0"/>
+              </a:spcBef>
+              <a:spcAft>
+                <a:spcPts val="0"/>
+              </a:spcAft>
+              <a:buFont typeface="Arial" panose="020B0604020202020204" pitchFamily="34" charset="0"/>
+              <a:buChar char="•"/>
+            </a:pPr>
+            <a:r>
+              <a:rPr lang="en-US" dirty="0">
+                <a:latin typeface="Lato"/>
+                <a:ea typeface="Lato"/>
+                <a:cs typeface="Lato"/>
+                <a:sym typeface="Lato"/>
+              </a:rPr>
+              <a:t>Building a low-code PaaS to enable people quickly build APIs for mobile apps etc. secured by ASK's pipeline</a:t>
+            </a:r>
+            <a:endParaRPr dirty="0">
+              <a:latin typeface="Lato"/>
+              <a:ea typeface="Lato"/>
+              <a:cs typeface="Lato"/>
+              <a:sym typeface="Lato"/>
+            </a:endParaRPr>
+          </a:p>
+        </p:txBody>
+      </p:sp>
+    </p:spTree>
+  </p:cSld>
+  <p:clrMapOvr>
+    <a:masterClrMapping/>
+  </p:clrMapOvr>
+</p:sld>
+</file>
+
+<file path=ppt/slides/slide14.xml><?xml version="1.0" encoding="utf-8"?>
+<p:sld xmlns:a="http://schemas.openxmlformats.org/drawingml/2006/main" xmlns:r="http://schemas.openxmlformats.org/officeDocument/2006/relationships" xmlns:p="http://schemas.openxmlformats.org/presentationml/2006/main">
+  <p:cSld>
+    <p:spTree>
+      <p:nvGrpSpPr>
+        <p:cNvPr id="1" name="Shape 298"/>
+        <p:cNvGrpSpPr/>
+        <p:nvPr/>
+      </p:nvGrpSpPr>
+      <p:grpSpPr>
+        <a:xfrm>
+          <a:off x="0" y="0"/>
+          <a:ext cx="0" cy="0"/>
+          <a:chOff x="0" y="0"/>
+          <a:chExt cx="0" cy="0"/>
+        </a:xfrm>
+      </p:grpSpPr>
+      <p:sp>
+        <p:nvSpPr>
+          <p:cNvPr id="299" name="Google Shape;299;p46"/>
+          <p:cNvSpPr txBox="1">
+            <a:spLocks noGrp="1"/>
+          </p:cNvSpPr>
+          <p:nvPr>
+            <p:ph type="title"/>
+          </p:nvPr>
+        </p:nvSpPr>
+        <p:spPr>
+          <a:xfrm>
+            <a:off x="494617" y="229550"/>
+            <a:ext cx="5647500" cy="576000"/>
+          </a:xfrm>
+          <a:prstGeom prst="rect">
+            <a:avLst/>
+          </a:prstGeom>
+        </p:spPr>
+        <p:txBody>
+          <a:bodyPr spcFirstLastPara="1" wrap="square" lIns="91425" tIns="91425" rIns="91425" bIns="91425" anchor="t" anchorCtr="0">
+            <a:noAutofit/>
+          </a:bodyPr>
+          <a:lstStyle/>
+          <a:p>
+            <a:pPr marL="0" lvl="0" indent="0" algn="l" rtl="0">
+              <a:spcBef>
+                <a:spcPts val="0"/>
+              </a:spcBef>
+              <a:spcAft>
+                <a:spcPts val="0"/>
+              </a:spcAft>
+              <a:buNone/>
+            </a:pPr>
+            <a:r>
               <a:rPr lang="en" sz="2000" dirty="0"/>
               <a:t>Your Aha Moment !</a:t>
             </a:r>
@@ -17121,7 +18001,7 @@
 </p:sld>
 </file>
 
-<file path=ppt/slides/slide12.xml><?xml version="1.0" encoding="utf-8"?>
+<file path=ppt/slides/slide15.xml><?xml version="1.0" encoding="utf-8"?>
 <p:sld xmlns:a="http://schemas.openxmlformats.org/drawingml/2006/main" xmlns:r="http://schemas.openxmlformats.org/officeDocument/2006/relationships" xmlns:p="http://schemas.openxmlformats.org/presentationml/2006/main">
   <p:cSld>
     <p:spTree>
@@ -17298,9 +18178,8 @@
             </a:pPr>
             <a:r>
               <a:rPr lang="en-US" sz="2000" dirty="0"/>
-              <a:t>Why Zero Trust</a:t>
+              <a:t>What is Zero Trust</a:t>
             </a:r>
-            <a:endParaRPr sz="2000" dirty="0"/>
           </a:p>
         </p:txBody>
       </p:sp>
@@ -17340,20 +18219,29 @@
               <a:buChar char="•"/>
             </a:pPr>
             <a:r>
-              <a:rPr lang="en-US" dirty="0">
-                <a:solidFill>
-                  <a:srgbClr val="222222"/>
-                </a:solidFill>
-                <a:highlight>
-                  <a:srgbClr val="FFFFFF"/>
-                </a:highlight>
-                <a:latin typeface="Lato"/>
-                <a:ea typeface="Lato"/>
-                <a:cs typeface="Lato"/>
-                <a:sym typeface="Lato"/>
+              <a:rPr lang="en-US" b="0" i="0" dirty="0">
+                <a:solidFill>
+                  <a:srgbClr val="242424"/>
+                </a:solidFill>
+                <a:effectLst/>
+                <a:latin typeface="Lato" panose="020F0502020204030203" pitchFamily="34" charset="0"/>
+                <a:ea typeface="Lato" panose="020F0502020204030203" pitchFamily="34" charset="0"/>
+                <a:cs typeface="Lato" panose="020F0502020204030203" pitchFamily="34" charset="0"/>
               </a:rPr>
-              <a:t>Perimeter-based security is ineffective in current landscape of cloud computing and remote workforce</a:t>
+              <a:t>Zero trust is a cybersecurity model that emphasizes on verifying access to protected digital resources with zero assumed trust. Every request is verified with all available options regardless of whether the request is coming from an unknown or trusted network, or whether there is a human or a machine behind the request.</a:t>
             </a:r>
+            <a:endParaRPr lang="en-US" dirty="0">
+              <a:solidFill>
+                <a:srgbClr val="222222"/>
+              </a:solidFill>
+              <a:highlight>
+                <a:srgbClr val="FFFFFF"/>
+              </a:highlight>
+              <a:latin typeface="Lato" panose="020F0502020204030203" pitchFamily="34" charset="0"/>
+              <a:ea typeface="Lato" panose="020F0502020204030203" pitchFamily="34" charset="0"/>
+              <a:cs typeface="Lato" panose="020F0502020204030203" pitchFamily="34" charset="0"/>
+              <a:sym typeface="Lato"/>
+            </a:endParaRPr>
           </a:p>
           <a:p>
             <a:pPr lvl="0" algn="l" rtl="0">
@@ -17389,30 +18277,17 @@
               <a:buChar char="•"/>
             </a:pPr>
             <a:r>
-              <a:rPr lang="en-US" dirty="0">
-                <a:solidFill>
-                  <a:srgbClr val="222222"/>
-                </a:solidFill>
-                <a:highlight>
-                  <a:srgbClr val="FFFFFF"/>
-                </a:highlight>
-                <a:latin typeface="Lato"/>
-                <a:ea typeface="Lato"/>
-                <a:cs typeface="Lato"/>
-                <a:sym typeface="Lato"/>
+              <a:rPr lang="en-US" b="0" i="0" dirty="0">
+                <a:solidFill>
+                  <a:srgbClr val="242424"/>
+                </a:solidFill>
+                <a:effectLst/>
+                <a:latin typeface="Lato" panose="020F0502020204030203" pitchFamily="34" charset="0"/>
+                <a:ea typeface="Lato" panose="020F0502020204030203" pitchFamily="34" charset="0"/>
+                <a:cs typeface="Lato" panose="020F0502020204030203" pitchFamily="34" charset="0"/>
               </a:rPr>
-              <a:t>Increasing dependency on Third-party services and components has multiplied the attack surface</a:t>
+              <a:t>Zero trust is the recommended security model by National Institute of Standards and Technology (NIST), Government of United States.</a:t>
             </a:r>
-          </a:p>
-          <a:p>
-            <a:pPr lvl="0" algn="l" rtl="0">
-              <a:spcBef>
-                <a:spcPts val="0"/>
-              </a:spcBef>
-              <a:spcAft>
-                <a:spcPts val="0"/>
-              </a:spcAft>
-            </a:pPr>
             <a:endParaRPr lang="en-US" dirty="0">
               <a:solidFill>
                 <a:srgbClr val="222222"/>
@@ -17420,108 +18295,9 @@
               <a:highlight>
                 <a:srgbClr val="FFFFFF"/>
               </a:highlight>
-              <a:latin typeface="Lato"/>
-              <a:ea typeface="Lato"/>
-              <a:cs typeface="Lato"/>
-              <a:sym typeface="Lato"/>
-            </a:endParaRPr>
-          </a:p>
-          <a:p>
-            <a:pPr marL="285750" lvl="0" indent="-285750" algn="l" rtl="0">
-              <a:spcBef>
-                <a:spcPts val="0"/>
-              </a:spcBef>
-              <a:spcAft>
-                <a:spcPts val="0"/>
-              </a:spcAft>
-              <a:buFont typeface="Arial" panose="020B0604020202020204" pitchFamily="34" charset="0"/>
-              <a:buChar char="•"/>
-            </a:pPr>
-            <a:r>
-              <a:rPr lang="en-US" dirty="0">
-                <a:solidFill>
-                  <a:srgbClr val="222222"/>
-                </a:solidFill>
-                <a:highlight>
-                  <a:srgbClr val="FFFFFF"/>
-                </a:highlight>
-                <a:latin typeface="Lato"/>
-                <a:ea typeface="Lato"/>
-                <a:cs typeface="Lato"/>
-                <a:sym typeface="Lato"/>
-              </a:rPr>
-              <a:t>Increase in sophistication and number of cyber attacks</a:t>
-            </a:r>
-          </a:p>
-          <a:p>
-            <a:pPr lvl="0" algn="l" rtl="0">
-              <a:spcBef>
-                <a:spcPts val="0"/>
-              </a:spcBef>
-              <a:spcAft>
-                <a:spcPts val="0"/>
-              </a:spcAft>
-            </a:pPr>
-            <a:endParaRPr lang="en-US" dirty="0">
-              <a:solidFill>
-                <a:srgbClr val="222222"/>
-              </a:solidFill>
-              <a:highlight>
-                <a:srgbClr val="FFFFFF"/>
-              </a:highlight>
-              <a:latin typeface="Lato"/>
-              <a:ea typeface="Lato"/>
-              <a:cs typeface="Lato"/>
-              <a:sym typeface="Lato"/>
-            </a:endParaRPr>
-          </a:p>
-          <a:p>
-            <a:pPr marL="285750" lvl="0" indent="-285750" algn="l" rtl="0">
-              <a:spcBef>
-                <a:spcPts val="0"/>
-              </a:spcBef>
-              <a:spcAft>
-                <a:spcPts val="0"/>
-              </a:spcAft>
-              <a:buFont typeface="Arial" panose="020B0604020202020204" pitchFamily="34" charset="0"/>
-              <a:buChar char="•"/>
-            </a:pPr>
-            <a:r>
-              <a:rPr lang="en-US" dirty="0">
-                <a:solidFill>
-                  <a:srgbClr val="222222"/>
-                </a:solidFill>
-                <a:highlight>
-                  <a:srgbClr val="FFFFFF"/>
-                </a:highlight>
-                <a:latin typeface="Lato"/>
-                <a:ea typeface="Lato"/>
-                <a:cs typeface="Lato"/>
-                <a:sym typeface="Lato"/>
-              </a:rPr>
-              <a:t>Popularity of API-first approach has magnified data exposure to untrusted clients</a:t>
-            </a:r>
-          </a:p>
-          <a:p>
-            <a:pPr marL="0" lvl="0" indent="0" algn="l" rtl="0">
-              <a:spcBef>
-                <a:spcPts val="0"/>
-              </a:spcBef>
-              <a:spcAft>
-                <a:spcPts val="0"/>
-              </a:spcAft>
-              <a:buNone/>
-            </a:pPr>
-            <a:endParaRPr lang="en-US" dirty="0">
-              <a:solidFill>
-                <a:srgbClr val="222222"/>
-              </a:solidFill>
-              <a:highlight>
-                <a:srgbClr val="FFFFFF"/>
-              </a:highlight>
-              <a:latin typeface="Lato"/>
-              <a:ea typeface="Lato"/>
-              <a:cs typeface="Lato"/>
+              <a:latin typeface="Lato" panose="020F0502020204030203" pitchFamily="34" charset="0"/>
+              <a:ea typeface="Lato" panose="020F0502020204030203" pitchFamily="34" charset="0"/>
+              <a:cs typeface="Lato" panose="020F0502020204030203" pitchFamily="34" charset="0"/>
               <a:sym typeface="Lato"/>
             </a:endParaRPr>
           </a:p>
@@ -17541,48 +18317,6 @@
               <a:cs typeface="Lato"/>
               <a:sym typeface="Lato"/>
             </a:endParaRPr>
-          </a:p>
-        </p:txBody>
-      </p:sp>
-      <p:sp>
-        <p:nvSpPr>
-          <p:cNvPr id="2" name="TextBox 1">
-            <a:extLst>
-              <a:ext uri="{FF2B5EF4-FFF2-40B4-BE49-F238E27FC236}">
-                <a16:creationId xmlns:a16="http://schemas.microsoft.com/office/drawing/2014/main" id="{DF4F9113-D3D9-5617-E5C4-D3E424395412}"/>
-              </a:ext>
-            </a:extLst>
-          </p:cNvPr>
-          <p:cNvSpPr txBox="1"/>
-          <p:nvPr/>
-        </p:nvSpPr>
-        <p:spPr>
-          <a:xfrm>
-            <a:off x="619760" y="4603573"/>
-            <a:ext cx="6797040" cy="307777"/>
-          </a:xfrm>
-          <a:prstGeom prst="rect">
-            <a:avLst/>
-          </a:prstGeom>
-          <a:noFill/>
-        </p:spPr>
-        <p:txBody>
-          <a:bodyPr wrap="square" rtlCol="0">
-            <a:spAutoFit/>
-          </a:bodyPr>
-          <a:lstStyle/>
-          <a:p>
-            <a:r>
-              <a:rPr lang="en-US" dirty="0"/>
-              <a:t>Details in the </a:t>
-            </a:r>
-            <a:r>
-              <a:rPr lang="en-US" dirty="0">
-                <a:hlinkClick r:id="rId3"/>
-              </a:rPr>
-              <a:t>whitepaper</a:t>
-            </a:r>
-            <a:endParaRPr lang="en-US" dirty="0"/>
           </a:p>
         </p:txBody>
       </p:sp>
@@ -17647,15 +18381,7 @@
             </a:pPr>
             <a:r>
               <a:rPr lang="en-US" sz="2000" dirty="0"/>
-              <a:t>Why </a:t>
-            </a:r>
-            <a:r>
-              <a:rPr lang="en-US" sz="2000" dirty="0" err="1"/>
-              <a:t>ASPSecurityKit</a:t>
-            </a:r>
-            <a:r>
-              <a:rPr lang="en-US" sz="2000" dirty="0"/>
-              <a:t> for Zero Trust Approach ?</a:t>
+              <a:t>Why Zero Trust</a:t>
             </a:r>
             <a:endParaRPr sz="2000" dirty="0"/>
           </a:p>
@@ -17709,19 +18435,17 @@
                 <a:cs typeface="Lato"/>
                 <a:sym typeface="Lato"/>
               </a:rPr>
-              <a:t>The only security framework in ASP.NET designed from ground-up for zero trust</a:t>
+              <a:t>Perimeter-based security is ineffective in current landscape of cloud computing and remote workforce</a:t>
             </a:r>
           </a:p>
           <a:p>
-            <a:pPr marL="285750" lvl="0" indent="-285750" algn="l" rtl="0">
-              <a:spcBef>
-                <a:spcPts val="0"/>
-              </a:spcBef>
-              <a:spcAft>
-                <a:spcPts val="0"/>
-              </a:spcAft>
-              <a:buFont typeface="Arial" panose="020B0604020202020204" pitchFamily="34" charset="0"/>
-              <a:buChar char="•"/>
+            <a:pPr lvl="0" algn="l" rtl="0">
+              <a:spcBef>
+                <a:spcPts val="0"/>
+              </a:spcBef>
+              <a:spcAft>
+                <a:spcPts val="0"/>
+              </a:spcAft>
             </a:pPr>
             <a:endParaRPr lang="en-US" dirty="0">
               <a:solidFill>
@@ -17737,7 +18461,13 @@
             </a:endParaRPr>
           </a:p>
           <a:p>
-            <a:pPr marL="285750" lvl="7" indent="-285750">
+            <a:pPr marL="285750" lvl="0" indent="-285750" algn="l" rtl="0">
+              <a:spcBef>
+                <a:spcPts val="0"/>
+              </a:spcBef>
+              <a:spcAft>
+                <a:spcPts val="0"/>
+              </a:spcAft>
               <a:buFont typeface="Arial" panose="020B0604020202020204" pitchFamily="34" charset="0"/>
               <a:buChar char="•"/>
             </a:pPr>
@@ -17754,7 +18484,7 @@
                 <a:cs typeface="Lato"/>
                 <a:sym typeface="Lato"/>
               </a:rPr>
-              <a:t>ASP.NET security assumes full-trust by default</a:t>
+              <a:t>Increasing dependency on Third-party services and components has multiplied the attack surface</a:t>
             </a:r>
           </a:p>
           <a:p>
@@ -17780,7 +18510,13 @@
             </a:endParaRPr>
           </a:p>
           <a:p>
-            <a:pPr marL="285750" lvl="3" indent="-285750">
+            <a:pPr marL="285750" lvl="0" indent="-285750" algn="l" rtl="0">
+              <a:spcBef>
+                <a:spcPts val="0"/>
+              </a:spcBef>
+              <a:spcAft>
+                <a:spcPts val="0"/>
+              </a:spcAft>
               <a:buFont typeface="Arial" panose="020B0604020202020204" pitchFamily="34" charset="0"/>
               <a:buChar char="•"/>
             </a:pPr>
@@ -17797,13 +18533,17 @@
                 <a:cs typeface="Lato"/>
                 <a:sym typeface="Lato"/>
               </a:rPr>
-              <a:t>Single, uniform security pipeline to enforce all kinds of security policies</a:t>
+              <a:t>Increase in sophistication and number of cyber attacks</a:t>
             </a:r>
           </a:p>
           <a:p>
-            <a:pPr marL="285750" lvl="3" indent="-285750">
-              <a:buFont typeface="Arial" panose="020B0604020202020204" pitchFamily="34" charset="0"/>
-              <a:buChar char="•"/>
+            <a:pPr lvl="0" algn="l" rtl="0">
+              <a:spcBef>
+                <a:spcPts val="0"/>
+              </a:spcBef>
+              <a:spcAft>
+                <a:spcPts val="0"/>
+              </a:spcAft>
             </a:pPr>
             <a:endParaRPr lang="en-US" dirty="0">
               <a:solidFill>
@@ -17819,7 +18559,13 @@
             </a:endParaRPr>
           </a:p>
           <a:p>
-            <a:pPr marL="285750" lvl="3" indent="-285750">
+            <a:pPr marL="285750" lvl="0" indent="-285750" algn="l" rtl="0">
+              <a:spcBef>
+                <a:spcPts val="0"/>
+              </a:spcBef>
+              <a:spcAft>
+                <a:spcPts val="0"/>
+              </a:spcAft>
               <a:buFont typeface="Arial" panose="020B0604020202020204" pitchFamily="34" charset="0"/>
               <a:buChar char="•"/>
             </a:pPr>
@@ -17836,7 +18582,7 @@
                 <a:cs typeface="Lato"/>
                 <a:sym typeface="Lato"/>
               </a:rPr>
-              <a:t>Built-in policies include XSS mitigation, third-party and first-party authentication options, IP firewall, two-factor, account verification, granular authorization, entity suspension, etc.</a:t>
+              <a:t>Popularity of API-first approach has magnified data exposure to untrusted clients</a:t>
             </a:r>
           </a:p>
           <a:p>
@@ -17881,10 +18627,52 @@
           </a:p>
         </p:txBody>
       </p:sp>
+      <p:sp>
+        <p:nvSpPr>
+          <p:cNvPr id="2" name="TextBox 1">
+            <a:extLst>
+              <a:ext uri="{FF2B5EF4-FFF2-40B4-BE49-F238E27FC236}">
+                <a16:creationId xmlns:a16="http://schemas.microsoft.com/office/drawing/2014/main" id="{DF4F9113-D3D9-5617-E5C4-D3E424395412}"/>
+              </a:ext>
+            </a:extLst>
+          </p:cNvPr>
+          <p:cNvSpPr txBox="1"/>
+          <p:nvPr/>
+        </p:nvSpPr>
+        <p:spPr>
+          <a:xfrm>
+            <a:off x="619760" y="4603573"/>
+            <a:ext cx="6797040" cy="307777"/>
+          </a:xfrm>
+          <a:prstGeom prst="rect">
+            <a:avLst/>
+          </a:prstGeom>
+          <a:noFill/>
+        </p:spPr>
+        <p:txBody>
+          <a:bodyPr wrap="square" rtlCol="0">
+            <a:spAutoFit/>
+          </a:bodyPr>
+          <a:lstStyle/>
+          <a:p>
+            <a:r>
+              <a:rPr lang="en-US" dirty="0"/>
+              <a:t>Details in the </a:t>
+            </a:r>
+            <a:r>
+              <a:rPr lang="en-US" dirty="0">
+                <a:hlinkClick r:id="rId3"/>
+              </a:rPr>
+              <a:t>whitepaper</a:t>
+            </a:r>
+            <a:endParaRPr lang="en-US" dirty="0"/>
+          </a:p>
+        </p:txBody>
+      </p:sp>
     </p:spTree>
     <p:extLst>
       <p:ext uri="{BB962C8B-B14F-4D97-AF65-F5344CB8AC3E}">
-        <p14:creationId xmlns:p14="http://schemas.microsoft.com/office/powerpoint/2010/main" val="1271962853"/>
+        <p14:creationId xmlns:p14="http://schemas.microsoft.com/office/powerpoint/2010/main" val="58502117"/>
       </p:ext>
     </p:extLst>
   </p:cSld>
@@ -17947,15 +18735,7 @@
             </a:pPr>
             <a:r>
               <a:rPr lang="en-US" sz="2000" dirty="0"/>
-              <a:t>Why </a:t>
-            </a:r>
-            <a:r>
-              <a:rPr lang="en-US" sz="2000" dirty="0" err="1"/>
-              <a:t>ASPSecurityKit</a:t>
-            </a:r>
-            <a:r>
-              <a:rPr lang="en-US" sz="2000" dirty="0"/>
-              <a:t> for Zero Trust Approach ?</a:t>
+              <a:t>Why ASPSecurityKit for Zero Trust Approach ?</a:t>
             </a:r>
             <a:endParaRPr sz="2000" dirty="0"/>
           </a:p>
@@ -18009,17 +18789,19 @@
                 <a:cs typeface="Lato"/>
                 <a:sym typeface="Lato"/>
               </a:rPr>
-              <a:t>All policies are enforced by default on every request unless explicitly excluded</a:t>
+              <a:t>The only security framework in ASP.NET designed from ground-up for zero trust</a:t>
             </a:r>
           </a:p>
           <a:p>
-            <a:pPr lvl="0" algn="l" rtl="0">
-              <a:spcBef>
-                <a:spcPts val="0"/>
-              </a:spcBef>
-              <a:spcAft>
-                <a:spcPts val="0"/>
-              </a:spcAft>
+            <a:pPr marL="285750" lvl="0" indent="-285750" algn="l" rtl="0">
+              <a:spcBef>
+                <a:spcPts val="0"/>
+              </a:spcBef>
+              <a:spcAft>
+                <a:spcPts val="0"/>
+              </a:spcAft>
+              <a:buFont typeface="Arial" panose="020B0604020202020204" pitchFamily="34" charset="0"/>
+              <a:buChar char="•"/>
             </a:pPr>
             <a:endParaRPr lang="en-US" dirty="0">
               <a:solidFill>
@@ -18035,13 +18817,7 @@
             </a:endParaRPr>
           </a:p>
           <a:p>
-            <a:pPr marL="285750" lvl="0" indent="-285750" algn="l" rtl="0">
-              <a:spcBef>
-                <a:spcPts val="0"/>
-              </a:spcBef>
-              <a:spcAft>
-                <a:spcPts val="0"/>
-              </a:spcAft>
+            <a:pPr marL="285750" lvl="7" indent="-285750">
               <a:buFont typeface="Arial" panose="020B0604020202020204" pitchFamily="34" charset="0"/>
               <a:buChar char="•"/>
             </a:pPr>
@@ -18058,7 +18834,7 @@
                 <a:cs typeface="Lato"/>
                 <a:sym typeface="Lato"/>
               </a:rPr>
-              <a:t>Forces developers to automatically think with a Security-first mindset</a:t>
+              <a:t>ASP.NET security assumes full-trust by default</a:t>
             </a:r>
           </a:p>
           <a:p>
@@ -18084,13 +18860,7 @@
             </a:endParaRPr>
           </a:p>
           <a:p>
-            <a:pPr marL="285750" lvl="0" indent="-285750" algn="l" rtl="0">
-              <a:spcBef>
-                <a:spcPts val="0"/>
-              </a:spcBef>
-              <a:spcAft>
-                <a:spcPts val="0"/>
-              </a:spcAft>
+            <a:pPr marL="285750" lvl="3" indent="-285750">
               <a:buFont typeface="Arial" panose="020B0604020202020204" pitchFamily="34" charset="0"/>
               <a:buChar char="•"/>
             </a:pPr>
@@ -18107,17 +18877,13 @@
                 <a:cs typeface="Lato"/>
                 <a:sym typeface="Lato"/>
               </a:rPr>
-              <a:t>Unmatched flexibility of the pipeline to adapt to any authentication and access verification scenario</a:t>
+              <a:t>Single, uniform security pipeline to enforce all kinds of security policies</a:t>
             </a:r>
           </a:p>
           <a:p>
-            <a:pPr lvl="0" algn="l" rtl="0">
-              <a:spcBef>
-                <a:spcPts val="0"/>
-              </a:spcBef>
-              <a:spcAft>
-                <a:spcPts val="0"/>
-              </a:spcAft>
+            <a:pPr marL="285750" lvl="3" indent="-285750">
+              <a:buFont typeface="Arial" panose="020B0604020202020204" pitchFamily="34" charset="0"/>
+              <a:buChar char="•"/>
             </a:pPr>
             <a:endParaRPr lang="en-US" dirty="0">
               <a:solidFill>
@@ -18133,13 +18899,7 @@
             </a:endParaRPr>
           </a:p>
           <a:p>
-            <a:pPr marL="285750" lvl="0" indent="-285750" algn="l" rtl="0">
-              <a:spcBef>
-                <a:spcPts val="0"/>
-              </a:spcBef>
-              <a:spcAft>
-                <a:spcPts val="0"/>
-              </a:spcAft>
+            <a:pPr marL="285750" lvl="3" indent="-285750">
               <a:buFont typeface="Arial" panose="020B0604020202020204" pitchFamily="34" charset="0"/>
               <a:buChar char="•"/>
             </a:pPr>
@@ -18156,7 +18916,7 @@
                 <a:cs typeface="Lato"/>
                 <a:sym typeface="Lato"/>
               </a:rPr>
-              <a:t>Notifications to concerned individuals upon sensitive activities</a:t>
+              <a:t>Built-in policies include XSS mitigation, third-party and first-party authentication options, IP firewall, two-factor, account verification, granular authorization, entity suspension, etc.</a:t>
             </a:r>
           </a:p>
           <a:p>
@@ -18201,52 +18961,10 @@
           </a:p>
         </p:txBody>
       </p:sp>
-      <p:sp>
-        <p:nvSpPr>
-          <p:cNvPr id="4" name="TextBox 3">
-            <a:extLst>
-              <a:ext uri="{FF2B5EF4-FFF2-40B4-BE49-F238E27FC236}">
-                <a16:creationId xmlns:a16="http://schemas.microsoft.com/office/drawing/2014/main" id="{78309AA1-3314-0E77-1BA6-48D8FBFBEB41}"/>
-              </a:ext>
-            </a:extLst>
-          </p:cNvPr>
-          <p:cNvSpPr txBox="1"/>
-          <p:nvPr/>
-        </p:nvSpPr>
-        <p:spPr>
-          <a:xfrm>
-            <a:off x="619760" y="4603573"/>
-            <a:ext cx="6797040" cy="307777"/>
-          </a:xfrm>
-          <a:prstGeom prst="rect">
-            <a:avLst/>
-          </a:prstGeom>
-          <a:noFill/>
-        </p:spPr>
-        <p:txBody>
-          <a:bodyPr wrap="square" rtlCol="0">
-            <a:spAutoFit/>
-          </a:bodyPr>
-          <a:lstStyle/>
-          <a:p>
-            <a:r>
-              <a:rPr lang="en-US" dirty="0"/>
-              <a:t>Check out </a:t>
-            </a:r>
-            <a:r>
-              <a:rPr lang="en-US" dirty="0">
-                <a:hlinkClick r:id="rId3"/>
-              </a:rPr>
-              <a:t>product video</a:t>
-            </a:r>
-            <a:endParaRPr lang="en-US" dirty="0"/>
-          </a:p>
-        </p:txBody>
-      </p:sp>
     </p:spTree>
     <p:extLst>
       <p:ext uri="{BB962C8B-B14F-4D97-AF65-F5344CB8AC3E}">
-        <p14:creationId xmlns:p14="http://schemas.microsoft.com/office/powerpoint/2010/main" val="2942492167"/>
+        <p14:creationId xmlns:p14="http://schemas.microsoft.com/office/powerpoint/2010/main" val="1271962853"/>
       </p:ext>
     </p:extLst>
   </p:cSld>
@@ -18309,11 +19027,7 @@
             </a:pPr>
             <a:r>
               <a:rPr lang="en-US" sz="2000" dirty="0"/>
-              <a:t>Benefits of Automating Zero Trust with </a:t>
-            </a:r>
-            <a:r>
-              <a:rPr lang="en-US" sz="2000" dirty="0" err="1"/>
-              <a:t>ASPSecurityKit</a:t>
+              <a:t>Why ASPSecurityKit for Zero Trust Approach ?</a:t>
             </a:r>
             <a:endParaRPr sz="2000" dirty="0"/>
           </a:p>
@@ -18367,6 +19081,360 @@
                 <a:cs typeface="Lato"/>
                 <a:sym typeface="Lato"/>
               </a:rPr>
+              <a:t>All policies are enforced by default on every request unless explicitly excluded</a:t>
+            </a:r>
+          </a:p>
+          <a:p>
+            <a:pPr lvl="0" algn="l" rtl="0">
+              <a:spcBef>
+                <a:spcPts val="0"/>
+              </a:spcBef>
+              <a:spcAft>
+                <a:spcPts val="0"/>
+              </a:spcAft>
+            </a:pPr>
+            <a:endParaRPr lang="en-US" dirty="0">
+              <a:solidFill>
+                <a:srgbClr val="222222"/>
+              </a:solidFill>
+              <a:highlight>
+                <a:srgbClr val="FFFFFF"/>
+              </a:highlight>
+              <a:latin typeface="Lato"/>
+              <a:ea typeface="Lato"/>
+              <a:cs typeface="Lato"/>
+              <a:sym typeface="Lato"/>
+            </a:endParaRPr>
+          </a:p>
+          <a:p>
+            <a:pPr marL="285750" lvl="0" indent="-285750" algn="l" rtl="0">
+              <a:spcBef>
+                <a:spcPts val="0"/>
+              </a:spcBef>
+              <a:spcAft>
+                <a:spcPts val="0"/>
+              </a:spcAft>
+              <a:buFont typeface="Arial" panose="020B0604020202020204" pitchFamily="34" charset="0"/>
+              <a:buChar char="•"/>
+            </a:pPr>
+            <a:r>
+              <a:rPr lang="en-US" dirty="0">
+                <a:solidFill>
+                  <a:srgbClr val="222222"/>
+                </a:solidFill>
+                <a:highlight>
+                  <a:srgbClr val="FFFFFF"/>
+                </a:highlight>
+                <a:latin typeface="Lato"/>
+                <a:ea typeface="Lato"/>
+                <a:cs typeface="Lato"/>
+                <a:sym typeface="Lato"/>
+              </a:rPr>
+              <a:t>Forces developers to automatically think with a Security-first mindset</a:t>
+            </a:r>
+          </a:p>
+          <a:p>
+            <a:pPr lvl="0" algn="l" rtl="0">
+              <a:spcBef>
+                <a:spcPts val="0"/>
+              </a:spcBef>
+              <a:spcAft>
+                <a:spcPts val="0"/>
+              </a:spcAft>
+            </a:pPr>
+            <a:endParaRPr lang="en-US" dirty="0">
+              <a:solidFill>
+                <a:srgbClr val="222222"/>
+              </a:solidFill>
+              <a:highlight>
+                <a:srgbClr val="FFFFFF"/>
+              </a:highlight>
+              <a:latin typeface="Lato"/>
+              <a:ea typeface="Lato"/>
+              <a:cs typeface="Lato"/>
+              <a:sym typeface="Lato"/>
+            </a:endParaRPr>
+          </a:p>
+          <a:p>
+            <a:pPr marL="285750" lvl="0" indent="-285750" algn="l" rtl="0">
+              <a:spcBef>
+                <a:spcPts val="0"/>
+              </a:spcBef>
+              <a:spcAft>
+                <a:spcPts val="0"/>
+              </a:spcAft>
+              <a:buFont typeface="Arial" panose="020B0604020202020204" pitchFamily="34" charset="0"/>
+              <a:buChar char="•"/>
+            </a:pPr>
+            <a:r>
+              <a:rPr lang="en-US" dirty="0">
+                <a:solidFill>
+                  <a:srgbClr val="222222"/>
+                </a:solidFill>
+                <a:highlight>
+                  <a:srgbClr val="FFFFFF"/>
+                </a:highlight>
+                <a:latin typeface="Lato"/>
+                <a:ea typeface="Lato"/>
+                <a:cs typeface="Lato"/>
+                <a:sym typeface="Lato"/>
+              </a:rPr>
+              <a:t>Unmatched flexibility of the pipeline to adapt to any authentication and access verification scenario</a:t>
+            </a:r>
+          </a:p>
+          <a:p>
+            <a:pPr lvl="0" algn="l" rtl="0">
+              <a:spcBef>
+                <a:spcPts val="0"/>
+              </a:spcBef>
+              <a:spcAft>
+                <a:spcPts val="0"/>
+              </a:spcAft>
+            </a:pPr>
+            <a:endParaRPr lang="en-US" dirty="0">
+              <a:solidFill>
+                <a:srgbClr val="222222"/>
+              </a:solidFill>
+              <a:highlight>
+                <a:srgbClr val="FFFFFF"/>
+              </a:highlight>
+              <a:latin typeface="Lato"/>
+              <a:ea typeface="Lato"/>
+              <a:cs typeface="Lato"/>
+              <a:sym typeface="Lato"/>
+            </a:endParaRPr>
+          </a:p>
+          <a:p>
+            <a:pPr marL="285750" lvl="0" indent="-285750" algn="l" rtl="0">
+              <a:spcBef>
+                <a:spcPts val="0"/>
+              </a:spcBef>
+              <a:spcAft>
+                <a:spcPts val="0"/>
+              </a:spcAft>
+              <a:buFont typeface="Arial" panose="020B0604020202020204" pitchFamily="34" charset="0"/>
+              <a:buChar char="•"/>
+            </a:pPr>
+            <a:r>
+              <a:rPr lang="en-US" dirty="0">
+                <a:solidFill>
+                  <a:srgbClr val="222222"/>
+                </a:solidFill>
+                <a:highlight>
+                  <a:srgbClr val="FFFFFF"/>
+                </a:highlight>
+                <a:latin typeface="Lato"/>
+                <a:ea typeface="Lato"/>
+                <a:cs typeface="Lato"/>
+                <a:sym typeface="Lato"/>
+              </a:rPr>
+              <a:t>Notifications to concerned individuals upon sensitive activities</a:t>
+            </a:r>
+          </a:p>
+          <a:p>
+            <a:pPr marL="0" lvl="0" indent="0" algn="l" rtl="0">
+              <a:spcBef>
+                <a:spcPts val="0"/>
+              </a:spcBef>
+              <a:spcAft>
+                <a:spcPts val="0"/>
+              </a:spcAft>
+              <a:buNone/>
+            </a:pPr>
+            <a:endParaRPr lang="en-US" dirty="0">
+              <a:solidFill>
+                <a:srgbClr val="222222"/>
+              </a:solidFill>
+              <a:highlight>
+                <a:srgbClr val="FFFFFF"/>
+              </a:highlight>
+              <a:latin typeface="Lato"/>
+              <a:ea typeface="Lato"/>
+              <a:cs typeface="Lato"/>
+              <a:sym typeface="Lato"/>
+            </a:endParaRPr>
+          </a:p>
+          <a:p>
+            <a:pPr marL="0" lvl="0" indent="0" algn="l" rtl="0">
+              <a:spcBef>
+                <a:spcPts val="0"/>
+              </a:spcBef>
+              <a:spcAft>
+                <a:spcPts val="0"/>
+              </a:spcAft>
+              <a:buNone/>
+            </a:pPr>
+            <a:endParaRPr dirty="0">
+              <a:latin typeface="Lato"/>
+              <a:ea typeface="Lato"/>
+              <a:cs typeface="Lato"/>
+              <a:sym typeface="Lato"/>
+            </a:endParaRPr>
+          </a:p>
+        </p:txBody>
+      </p:sp>
+      <p:sp>
+        <p:nvSpPr>
+          <p:cNvPr id="4" name="TextBox 3">
+            <a:extLst>
+              <a:ext uri="{FF2B5EF4-FFF2-40B4-BE49-F238E27FC236}">
+                <a16:creationId xmlns:a16="http://schemas.microsoft.com/office/drawing/2014/main" id="{78309AA1-3314-0E77-1BA6-48D8FBFBEB41}"/>
+              </a:ext>
+            </a:extLst>
+          </p:cNvPr>
+          <p:cNvSpPr txBox="1"/>
+          <p:nvPr/>
+        </p:nvSpPr>
+        <p:spPr>
+          <a:xfrm>
+            <a:off x="619760" y="4603573"/>
+            <a:ext cx="6797040" cy="307777"/>
+          </a:xfrm>
+          <a:prstGeom prst="rect">
+            <a:avLst/>
+          </a:prstGeom>
+          <a:noFill/>
+        </p:spPr>
+        <p:txBody>
+          <a:bodyPr wrap="square" rtlCol="0">
+            <a:spAutoFit/>
+          </a:bodyPr>
+          <a:lstStyle/>
+          <a:p>
+            <a:r>
+              <a:rPr lang="en-US" dirty="0"/>
+              <a:t>Check out </a:t>
+            </a:r>
+            <a:r>
+              <a:rPr lang="en-US" dirty="0">
+                <a:hlinkClick r:id="rId3"/>
+              </a:rPr>
+              <a:t>product video</a:t>
+            </a:r>
+            <a:endParaRPr lang="en-US" dirty="0"/>
+          </a:p>
+        </p:txBody>
+      </p:sp>
+    </p:spTree>
+    <p:extLst>
+      <p:ext uri="{BB962C8B-B14F-4D97-AF65-F5344CB8AC3E}">
+        <p14:creationId xmlns:p14="http://schemas.microsoft.com/office/powerpoint/2010/main" val="2942492167"/>
+      </p:ext>
+    </p:extLst>
+  </p:cSld>
+  <p:clrMapOvr>
+    <a:masterClrMapping/>
+  </p:clrMapOvr>
+</p:sld>
+</file>
+
+<file path=ppt/slides/slide6.xml><?xml version="1.0" encoding="utf-8"?>
+<p:sld xmlns:a="http://schemas.openxmlformats.org/drawingml/2006/main" xmlns:r="http://schemas.openxmlformats.org/officeDocument/2006/relationships" xmlns:p="http://schemas.openxmlformats.org/presentationml/2006/main">
+  <p:cSld>
+    <p:spTree>
+      <p:nvGrpSpPr>
+        <p:cNvPr id="1" name="Shape 268"/>
+        <p:cNvGrpSpPr/>
+        <p:nvPr/>
+      </p:nvGrpSpPr>
+      <p:grpSpPr>
+        <a:xfrm>
+          <a:off x="0" y="0"/>
+          <a:ext cx="0" cy="0"/>
+          <a:chOff x="0" y="0"/>
+          <a:chExt cx="0" cy="0"/>
+        </a:xfrm>
+      </p:grpSpPr>
+      <p:sp>
+        <p:nvSpPr>
+          <p:cNvPr id="269" name="Google Shape;269;p41"/>
+          <p:cNvSpPr txBox="1">
+            <a:spLocks noGrp="1"/>
+          </p:cNvSpPr>
+          <p:nvPr>
+            <p:ph type="title"/>
+          </p:nvPr>
+        </p:nvSpPr>
+        <p:spPr>
+          <a:xfrm>
+            <a:off x="494629" y="229550"/>
+            <a:ext cx="8280000" cy="576000"/>
+          </a:xfrm>
+          <a:prstGeom prst="rect">
+            <a:avLst/>
+          </a:prstGeom>
+        </p:spPr>
+        <p:txBody>
+          <a:bodyPr spcFirstLastPara="1" wrap="square" lIns="91425" tIns="91425" rIns="91425" bIns="91425" anchor="t" anchorCtr="0">
+            <a:noAutofit/>
+          </a:bodyPr>
+          <a:lstStyle/>
+          <a:p>
+            <a:pPr marL="0" lvl="0" indent="0" algn="l" rtl="0">
+              <a:spcBef>
+                <a:spcPts val="0"/>
+              </a:spcBef>
+              <a:spcAft>
+                <a:spcPts val="0"/>
+              </a:spcAft>
+              <a:buNone/>
+            </a:pPr>
+            <a:r>
+              <a:rPr lang="en-US" sz="2000" dirty="0"/>
+              <a:t>Benefits of Automating Zero Trust with ASPSecurityKit</a:t>
+            </a:r>
+            <a:endParaRPr sz="2000" dirty="0"/>
+          </a:p>
+        </p:txBody>
+      </p:sp>
+      <p:sp>
+        <p:nvSpPr>
+          <p:cNvPr id="270" name="Google Shape;270;p41"/>
+          <p:cNvSpPr txBox="1"/>
+          <p:nvPr/>
+        </p:nvSpPr>
+        <p:spPr>
+          <a:xfrm>
+            <a:off x="512375" y="1151300"/>
+            <a:ext cx="8238600" cy="3414300"/>
+          </a:xfrm>
+          <a:prstGeom prst="rect">
+            <a:avLst/>
+          </a:prstGeom>
+          <a:noFill/>
+          <a:ln>
+            <a:noFill/>
+          </a:ln>
+        </p:spPr>
+        <p:txBody>
+          <a:bodyPr spcFirstLastPara="1" wrap="square" lIns="91425" tIns="91425" rIns="91425" bIns="91425" anchor="t" anchorCtr="0">
+            <a:noAutofit/>
+          </a:bodyPr>
+          <a:lstStyle/>
+          <a:p>
+            <a:pPr marL="285750" lvl="0" indent="-285750" algn="l" rtl="0">
+              <a:spcBef>
+                <a:spcPts val="0"/>
+              </a:spcBef>
+              <a:spcAft>
+                <a:spcPts val="0"/>
+              </a:spcAft>
+              <a:buFont typeface="Arial" panose="020B0604020202020204" pitchFamily="34" charset="0"/>
+              <a:buChar char="•"/>
+            </a:pPr>
+            <a:r>
+              <a:rPr lang="en-US" dirty="0">
+                <a:solidFill>
+                  <a:srgbClr val="222222"/>
+                </a:solidFill>
+                <a:highlight>
+                  <a:srgbClr val="FFFFFF"/>
+                </a:highlight>
+                <a:latin typeface="Lato"/>
+                <a:ea typeface="Lato"/>
+                <a:cs typeface="Lato"/>
+                <a:sym typeface="Lato"/>
+              </a:rPr>
               <a:t>Equip your existing workforce for zero-trust approach with minimum training</a:t>
             </a:r>
           </a:p>
@@ -18500,7 +19568,7 @@
 </p:sld>
 </file>
 
-<file path=ppt/slides/slide6.xml><?xml version="1.0" encoding="utf-8"?>
+<file path=ppt/slides/slide7.xml><?xml version="1.0" encoding="utf-8"?>
 <p:sld xmlns:a="http://schemas.openxmlformats.org/drawingml/2006/main" xmlns:r="http://schemas.openxmlformats.org/officeDocument/2006/relationships" xmlns:p="http://schemas.openxmlformats.org/presentationml/2006/main">
   <p:cSld>
     <p:spTree>
@@ -18824,7 +19892,7 @@
 </p:sld>
 </file>
 
-<file path=ppt/slides/slide7.xml><?xml version="1.0" encoding="utf-8"?>
+<file path=ppt/slides/slide8.xml><?xml version="1.0" encoding="utf-8"?>
 <p:sld xmlns:a="http://schemas.openxmlformats.org/drawingml/2006/main" xmlns:r="http://schemas.openxmlformats.org/officeDocument/2006/relationships" xmlns:p="http://schemas.openxmlformats.org/presentationml/2006/main">
   <p:cSld>
     <p:spTree>
@@ -19117,7 +20185,7 @@
 </p:sld>
 </file>
 
-<file path=ppt/slides/slide8.xml><?xml version="1.0" encoding="utf-8"?>
+<file path=ppt/slides/slide9.xml><?xml version="1.0" encoding="utf-8"?>
 <p:sld xmlns:a="http://schemas.openxmlformats.org/drawingml/2006/main" xmlns:r="http://schemas.openxmlformats.org/officeDocument/2006/relationships" xmlns:p="http://schemas.openxmlformats.org/presentationml/2006/main">
   <p:cSld>
     <p:spTree>
@@ -19355,229 +20423,6 @@
                 <a:spcPts val="0"/>
               </a:spcAft>
             </a:pPr>
-            <a:endParaRPr dirty="0">
-              <a:latin typeface="Lato"/>
-              <a:ea typeface="Lato"/>
-              <a:cs typeface="Lato"/>
-              <a:sym typeface="Lato"/>
-            </a:endParaRPr>
-          </a:p>
-        </p:txBody>
-      </p:sp>
-    </p:spTree>
-  </p:cSld>
-  <p:clrMapOvr>
-    <a:masterClrMapping/>
-  </p:clrMapOvr>
-</p:sld>
-</file>
-
-<file path=ppt/slides/slide9.xml><?xml version="1.0" encoding="utf-8"?>
-<p:sld xmlns:a="http://schemas.openxmlformats.org/drawingml/2006/main" xmlns:r="http://schemas.openxmlformats.org/officeDocument/2006/relationships" xmlns:p="http://schemas.openxmlformats.org/presentationml/2006/main">
-  <p:cSld>
-    <p:spTree>
-      <p:nvGrpSpPr>
-        <p:cNvPr id="1" name="Shape 292"/>
-        <p:cNvGrpSpPr/>
-        <p:nvPr/>
-      </p:nvGrpSpPr>
-      <p:grpSpPr>
-        <a:xfrm>
-          <a:off x="0" y="0"/>
-          <a:ext cx="0" cy="0"/>
-          <a:chOff x="0" y="0"/>
-          <a:chExt cx="0" cy="0"/>
-        </a:xfrm>
-      </p:grpSpPr>
-      <p:sp>
-        <p:nvSpPr>
-          <p:cNvPr id="293" name="Google Shape;293;p45"/>
-          <p:cNvSpPr txBox="1">
-            <a:spLocks noGrp="1"/>
-          </p:cNvSpPr>
-          <p:nvPr>
-            <p:ph type="title"/>
-          </p:nvPr>
-        </p:nvSpPr>
-        <p:spPr>
-          <a:xfrm>
-            <a:off x="494629" y="229550"/>
-            <a:ext cx="8280000" cy="576000"/>
-          </a:xfrm>
-          <a:prstGeom prst="rect">
-            <a:avLst/>
-          </a:prstGeom>
-        </p:spPr>
-        <p:txBody>
-          <a:bodyPr spcFirstLastPara="1" wrap="square" lIns="91425" tIns="91425" rIns="91425" bIns="91425" anchor="t" anchorCtr="0">
-            <a:noAutofit/>
-          </a:bodyPr>
-          <a:lstStyle/>
-          <a:p>
-            <a:pPr marL="0" lvl="0" indent="0" algn="l" rtl="0">
-              <a:spcBef>
-                <a:spcPts val="0"/>
-              </a:spcBef>
-              <a:spcAft>
-                <a:spcPts val="0"/>
-              </a:spcAft>
-              <a:buNone/>
-            </a:pPr>
-            <a:r>
-              <a:rPr lang="en" sz="2000">
-                <a:solidFill>
-                  <a:srgbClr val="222222"/>
-                </a:solidFill>
-                <a:highlight>
-                  <a:srgbClr val="FFFFFF"/>
-                </a:highlight>
-              </a:rPr>
-              <a:t>Key Differentiators &amp; Adoption Plan</a:t>
-            </a:r>
-            <a:endParaRPr sz="2000"/>
-          </a:p>
-        </p:txBody>
-      </p:sp>
-      <p:sp>
-        <p:nvSpPr>
-          <p:cNvPr id="294" name="Google Shape;294;p45"/>
-          <p:cNvSpPr txBox="1"/>
-          <p:nvPr/>
-        </p:nvSpPr>
-        <p:spPr>
-          <a:xfrm>
-            <a:off x="512375" y="1151300"/>
-            <a:ext cx="8238600" cy="3414300"/>
-          </a:xfrm>
-          <a:prstGeom prst="rect">
-            <a:avLst/>
-          </a:prstGeom>
-          <a:noFill/>
-          <a:ln>
-            <a:noFill/>
-          </a:ln>
-        </p:spPr>
-        <p:txBody>
-          <a:bodyPr spcFirstLastPara="1" wrap="square" lIns="91425" tIns="91425" rIns="91425" bIns="91425" anchor="t" anchorCtr="0">
-            <a:noAutofit/>
-          </a:bodyPr>
-          <a:lstStyle/>
-          <a:p>
-            <a:pPr marL="285750" lvl="0" indent="-285750" algn="l" rtl="0">
-              <a:spcBef>
-                <a:spcPts val="0"/>
-              </a:spcBef>
-              <a:spcAft>
-                <a:spcPts val="0"/>
-              </a:spcAft>
-              <a:buFont typeface="Arial" panose="020B0604020202020204" pitchFamily="34" charset="0"/>
-              <a:buChar char="•"/>
-            </a:pPr>
-            <a:r>
-              <a:rPr lang="en-US" dirty="0">
-                <a:latin typeface="Lato"/>
-                <a:ea typeface="Lato"/>
-                <a:cs typeface="Lato"/>
-                <a:sym typeface="Lato"/>
-              </a:rPr>
-              <a:t>To get started within minutes with </a:t>
-            </a:r>
-            <a:r>
-              <a:rPr lang="en-US" dirty="0" err="1">
-                <a:latin typeface="Lato"/>
-                <a:ea typeface="Lato"/>
-                <a:cs typeface="Lato"/>
-                <a:sym typeface="Lato"/>
-              </a:rPr>
-              <a:t>ASPSecurityKit</a:t>
-            </a:r>
-            <a:r>
-              <a:rPr lang="en-US" dirty="0">
-                <a:latin typeface="Lato"/>
-                <a:ea typeface="Lato"/>
-                <a:cs typeface="Lato"/>
-                <a:sym typeface="Lato"/>
-              </a:rPr>
-              <a:t>, we provide supplementary products called source packages, that give source implementation of profile/user management/admin portals and APIs, built on ASK framework, to save time developing these from scratch. This also enables teams to get started with business features of the prototype/product quickly. </a:t>
-            </a:r>
-          </a:p>
-          <a:p>
-            <a:pPr marL="285750" lvl="0" indent="-285750" algn="l" rtl="0">
-              <a:spcBef>
-                <a:spcPts val="0"/>
-              </a:spcBef>
-              <a:spcAft>
-                <a:spcPts val="0"/>
-              </a:spcAft>
-              <a:buFont typeface="Arial" panose="020B0604020202020204" pitchFamily="34" charset="0"/>
-              <a:buChar char="•"/>
-            </a:pPr>
-            <a:endParaRPr lang="en-US" dirty="0">
-              <a:latin typeface="Lato"/>
-              <a:ea typeface="Lato"/>
-              <a:cs typeface="Lato"/>
-              <a:sym typeface="Lato"/>
-            </a:endParaRPr>
-          </a:p>
-          <a:p>
-            <a:pPr marL="285750" lvl="0" indent="-285750" algn="l" rtl="0">
-              <a:spcBef>
-                <a:spcPts val="0"/>
-              </a:spcBef>
-              <a:spcAft>
-                <a:spcPts val="0"/>
-              </a:spcAft>
-              <a:buFont typeface="Arial" panose="020B0604020202020204" pitchFamily="34" charset="0"/>
-              <a:buChar char="•"/>
-            </a:pPr>
-            <a:r>
-              <a:rPr lang="en-US" dirty="0">
-                <a:latin typeface="Lato"/>
-                <a:ea typeface="Lato"/>
-                <a:cs typeface="Lato"/>
-                <a:sym typeface="Lato"/>
-              </a:rPr>
-              <a:t>Different source packages are available to get started with ASK on new or existing projects.</a:t>
-            </a:r>
-          </a:p>
-          <a:p>
-            <a:pPr marL="285750" lvl="0" indent="-285750" algn="l" rtl="0">
-              <a:spcBef>
-                <a:spcPts val="0"/>
-              </a:spcBef>
-              <a:spcAft>
-                <a:spcPts val="0"/>
-              </a:spcAft>
-              <a:buFont typeface="Arial" panose="020B0604020202020204" pitchFamily="34" charset="0"/>
-              <a:buChar char="•"/>
-            </a:pPr>
-            <a:endParaRPr lang="en-US" dirty="0">
-              <a:latin typeface="Lato"/>
-              <a:ea typeface="Lato"/>
-              <a:cs typeface="Lato"/>
-              <a:sym typeface="Lato"/>
-            </a:endParaRPr>
-          </a:p>
-          <a:p>
-            <a:pPr marL="285750" lvl="0" indent="-285750" algn="l" rtl="0">
-              <a:spcBef>
-                <a:spcPts val="0"/>
-              </a:spcBef>
-              <a:spcAft>
-                <a:spcPts val="0"/>
-              </a:spcAft>
-              <a:buFont typeface="Arial" panose="020B0604020202020204" pitchFamily="34" charset="0"/>
-              <a:buChar char="•"/>
-            </a:pPr>
-            <a:r>
-              <a:rPr lang="en-US" dirty="0">
-                <a:latin typeface="Lato"/>
-                <a:ea typeface="Lato"/>
-                <a:cs typeface="Lato"/>
-                <a:sym typeface="Lato"/>
-              </a:rPr>
-              <a:t>A NuGet tool is built that guides user through the process of installing/configuring source packages with ASK.</a:t>
-            </a:r>
             <a:endParaRPr dirty="0">
               <a:latin typeface="Lato"/>
               <a:ea typeface="Lato"/>

</xml_diff>